<commit_message>
Add new overview diagram for conference paper
</commit_message>
<xml_diff>
--- a/docs/design/design-diagrams-updated.pptx
+++ b/docs/design/design-diagrams-updated.pptx
@@ -5,25 +5,26 @@
     <p:sldMasterId id="2147483648" r:id="rId1"/>
   </p:sldMasterIdLst>
   <p:notesMasterIdLst>
-    <p:notesMasterId r:id="rId18"/>
+    <p:notesMasterId r:id="rId19"/>
   </p:notesMasterIdLst>
   <p:sldIdLst>
     <p:sldId id="256" r:id="rId2"/>
     <p:sldId id="262" r:id="rId3"/>
     <p:sldId id="275" r:id="rId4"/>
-    <p:sldId id="266" r:id="rId5"/>
-    <p:sldId id="268" r:id="rId6"/>
-    <p:sldId id="263" r:id="rId7"/>
-    <p:sldId id="269" r:id="rId8"/>
-    <p:sldId id="264" r:id="rId9"/>
-    <p:sldId id="265" r:id="rId10"/>
-    <p:sldId id="267" r:id="rId11"/>
-    <p:sldId id="258" r:id="rId12"/>
-    <p:sldId id="271" r:id="rId13"/>
-    <p:sldId id="270" r:id="rId14"/>
-    <p:sldId id="273" r:id="rId15"/>
-    <p:sldId id="274" r:id="rId16"/>
-    <p:sldId id="272" r:id="rId17"/>
+    <p:sldId id="276" r:id="rId5"/>
+    <p:sldId id="266" r:id="rId6"/>
+    <p:sldId id="268" r:id="rId7"/>
+    <p:sldId id="263" r:id="rId8"/>
+    <p:sldId id="269" r:id="rId9"/>
+    <p:sldId id="264" r:id="rId10"/>
+    <p:sldId id="265" r:id="rId11"/>
+    <p:sldId id="267" r:id="rId12"/>
+    <p:sldId id="258" r:id="rId13"/>
+    <p:sldId id="271" r:id="rId14"/>
+    <p:sldId id="270" r:id="rId15"/>
+    <p:sldId id="273" r:id="rId16"/>
+    <p:sldId id="274" r:id="rId17"/>
+    <p:sldId id="272" r:id="rId18"/>
   </p:sldIdLst>
   <p:sldSz cx="12192000" cy="6858000"/>
   <p:notesSz cx="6858000" cy="9144000"/>
@@ -130,6 +131,7 @@
             <p14:sldId id="256"/>
             <p14:sldId id="262"/>
             <p14:sldId id="275"/>
+            <p14:sldId id="276"/>
           </p14:sldIdLst>
         </p14:section>
         <p14:section name="Virtue/Unity" id="{0D0E284A-AE87-4BE3-8157-4E8B4CDEDCE8}">
@@ -252,7 +254,7 @@
           <a:p>
             <a:fld id="{E03A47CA-A540-497B-9B0F-ADA561AF46FF}" type="datetimeFigureOut">
               <a:rPr lang="en-US" smtClean="0"/>
-              <a:t>5/24/2018</a:t>
+              <a:t>4/29/2019</a:t>
             </a:fld>
             <a:endParaRPr lang="en-US"/>
           </a:p>
@@ -2819,7 +2821,7 @@
           <a:p>
             <a:fld id="{98E4D025-9800-4320-B6D5-0C2C5F31124D}" type="datetimeFigureOut">
               <a:rPr lang="en-US" smtClean="0"/>
-              <a:t>5/24/2018</a:t>
+              <a:t>4/29/2019</a:t>
             </a:fld>
             <a:endParaRPr lang="en-US"/>
           </a:p>
@@ -2996,7 +2998,7 @@
           <a:p>
             <a:fld id="{98E4D025-9800-4320-B6D5-0C2C5F31124D}" type="datetimeFigureOut">
               <a:rPr lang="en-US" smtClean="0"/>
-              <a:t>5/24/2018</a:t>
+              <a:t>4/29/2019</a:t>
             </a:fld>
             <a:endParaRPr lang="en-US"/>
           </a:p>
@@ -3176,7 +3178,7 @@
           <a:p>
             <a:fld id="{98E4D025-9800-4320-B6D5-0C2C5F31124D}" type="datetimeFigureOut">
               <a:rPr lang="en-US" smtClean="0"/>
-              <a:t>5/24/2018</a:t>
+              <a:t>4/29/2019</a:t>
             </a:fld>
             <a:endParaRPr lang="en-US"/>
           </a:p>
@@ -3353,7 +3355,7 @@
           <a:p>
             <a:fld id="{98E4D025-9800-4320-B6D5-0C2C5F31124D}" type="datetimeFigureOut">
               <a:rPr lang="en-US" smtClean="0"/>
-              <a:t>5/24/2018</a:t>
+              <a:t>4/29/2019</a:t>
             </a:fld>
             <a:endParaRPr lang="en-US"/>
           </a:p>
@@ -3606,7 +3608,7 @@
           <a:p>
             <a:fld id="{98E4D025-9800-4320-B6D5-0C2C5F31124D}" type="datetimeFigureOut">
               <a:rPr lang="en-US" smtClean="0"/>
-              <a:t>5/24/2018</a:t>
+              <a:t>4/29/2019</a:t>
             </a:fld>
             <a:endParaRPr lang="en-US"/>
           </a:p>
@@ -3845,7 +3847,7 @@
           <a:p>
             <a:fld id="{98E4D025-9800-4320-B6D5-0C2C5F31124D}" type="datetimeFigureOut">
               <a:rPr lang="en-US" smtClean="0"/>
-              <a:t>5/24/2018</a:t>
+              <a:t>4/29/2019</a:t>
             </a:fld>
             <a:endParaRPr lang="en-US"/>
           </a:p>
@@ -4219,7 +4221,7 @@
           <a:p>
             <a:fld id="{98E4D025-9800-4320-B6D5-0C2C5F31124D}" type="datetimeFigureOut">
               <a:rPr lang="en-US" smtClean="0"/>
-              <a:t>5/24/2018</a:t>
+              <a:t>4/29/2019</a:t>
             </a:fld>
             <a:endParaRPr lang="en-US"/>
           </a:p>
@@ -4344,7 +4346,7 @@
           <a:p>
             <a:fld id="{98E4D025-9800-4320-B6D5-0C2C5F31124D}" type="datetimeFigureOut">
               <a:rPr lang="en-US" smtClean="0"/>
-              <a:t>5/24/2018</a:t>
+              <a:t>4/29/2019</a:t>
             </a:fld>
             <a:endParaRPr lang="en-US"/>
           </a:p>
@@ -4446,7 +4448,7 @@
           <a:p>
             <a:fld id="{98E4D025-9800-4320-B6D5-0C2C5F31124D}" type="datetimeFigureOut">
               <a:rPr lang="en-US" smtClean="0"/>
-              <a:t>5/24/2018</a:t>
+              <a:t>4/29/2019</a:t>
             </a:fld>
             <a:endParaRPr lang="en-US"/>
           </a:p>
@@ -4723,7 +4725,7 @@
           <a:p>
             <a:fld id="{98E4D025-9800-4320-B6D5-0C2C5F31124D}" type="datetimeFigureOut">
               <a:rPr lang="en-US" smtClean="0"/>
-              <a:t>5/24/2018</a:t>
+              <a:t>4/29/2019</a:t>
             </a:fld>
             <a:endParaRPr lang="en-US"/>
           </a:p>
@@ -4976,7 +4978,7 @@
           <a:p>
             <a:fld id="{98E4D025-9800-4320-B6D5-0C2C5F31124D}" type="datetimeFigureOut">
               <a:rPr lang="en-US" smtClean="0"/>
-              <a:t>5/24/2018</a:t>
+              <a:t>4/29/2019</a:t>
             </a:fld>
             <a:endParaRPr lang="en-US"/>
           </a:p>
@@ -5189,7 +5191,7 @@
           <a:p>
             <a:fld id="{98E4D025-9800-4320-B6D5-0C2C5F31124D}" type="datetimeFigureOut">
               <a:rPr lang="en-US" smtClean="0"/>
-              <a:t>5/24/2018</a:t>
+              <a:t>4/29/2019</a:t>
             </a:fld>
             <a:endParaRPr lang="en-US"/>
           </a:p>
@@ -5705,6 +5707,801 @@
       </p:grpSpPr>
       <p:sp>
         <p:nvSpPr>
+          <p:cNvPr id="7" name="Rectangle 6"/>
+          <p:cNvSpPr/>
+          <p:nvPr/>
+        </p:nvSpPr>
+        <p:spPr>
+          <a:xfrm>
+            <a:off x="9241653" y="1908703"/>
+            <a:ext cx="2290439" cy="1821662"/>
+          </a:xfrm>
+          <a:prstGeom prst="rect">
+            <a:avLst/>
+          </a:prstGeom>
+        </p:spPr>
+        <p:style>
+          <a:lnRef idx="2">
+            <a:schemeClr val="accent6">
+              <a:shade val="50000"/>
+            </a:schemeClr>
+          </a:lnRef>
+          <a:fillRef idx="1">
+            <a:schemeClr val="accent6"/>
+          </a:fillRef>
+          <a:effectRef idx="0">
+            <a:schemeClr val="accent6"/>
+          </a:effectRef>
+          <a:fontRef idx="minor">
+            <a:schemeClr val="lt1"/>
+          </a:fontRef>
+        </p:style>
+        <p:txBody>
+          <a:bodyPr rtlCol="0" anchor="ctr"/>
+          <a:lstStyle/>
+          <a:p>
+            <a:pPr algn="ctr"/>
+            <a:r>
+              <a:rPr lang="en-US" sz="3200" dirty="0" smtClean="0"/>
+              <a:t>Excalibur</a:t>
+            </a:r>
+            <a:endParaRPr lang="en-US" sz="3200" dirty="0"/>
+          </a:p>
+        </p:txBody>
+      </p:sp>
+      <p:pic>
+        <p:nvPicPr>
+          <p:cNvPr id="9" name="Picture 8"/>
+          <p:cNvPicPr>
+            <a:picLocks noChangeAspect="1"/>
+          </p:cNvPicPr>
+          <p:nvPr/>
+        </p:nvPicPr>
+        <p:blipFill>
+          <a:blip r:embed="rId2"/>
+          <a:stretch>
+            <a:fillRect/>
+          </a:stretch>
+        </p:blipFill>
+        <p:spPr>
+          <a:xfrm>
+            <a:off x="739893" y="2022449"/>
+            <a:ext cx="2034038" cy="1534177"/>
+          </a:xfrm>
+          <a:prstGeom prst="rect">
+            <a:avLst/>
+          </a:prstGeom>
+        </p:spPr>
+      </p:pic>
+      <p:pic>
+        <p:nvPicPr>
+          <p:cNvPr id="10" name="Picture 9"/>
+          <p:cNvPicPr>
+            <a:picLocks noChangeAspect="1"/>
+          </p:cNvPicPr>
+          <p:nvPr/>
+        </p:nvPicPr>
+        <p:blipFill>
+          <a:blip r:embed="rId2"/>
+          <a:stretch>
+            <a:fillRect/>
+          </a:stretch>
+        </p:blipFill>
+        <p:spPr>
+          <a:xfrm>
+            <a:off x="739893" y="3556626"/>
+            <a:ext cx="2034038" cy="1534177"/>
+          </a:xfrm>
+          <a:prstGeom prst="rect">
+            <a:avLst/>
+          </a:prstGeom>
+        </p:spPr>
+      </p:pic>
+      <p:pic>
+        <p:nvPicPr>
+          <p:cNvPr id="39" name="Picture 38"/>
+          <p:cNvPicPr>
+            <a:picLocks noChangeAspect="1"/>
+          </p:cNvPicPr>
+          <p:nvPr/>
+        </p:nvPicPr>
+        <p:blipFill>
+          <a:blip r:embed="rId2"/>
+          <a:stretch>
+            <a:fillRect/>
+          </a:stretch>
+        </p:blipFill>
+        <p:spPr>
+          <a:xfrm>
+            <a:off x="3056965" y="5234506"/>
+            <a:ext cx="2034038" cy="1534177"/>
+          </a:xfrm>
+          <a:prstGeom prst="rect">
+            <a:avLst/>
+          </a:prstGeom>
+        </p:spPr>
+      </p:pic>
+      <p:pic>
+        <p:nvPicPr>
+          <p:cNvPr id="40" name="Picture 39"/>
+          <p:cNvPicPr>
+            <a:picLocks noChangeAspect="1"/>
+          </p:cNvPicPr>
+          <p:nvPr/>
+        </p:nvPicPr>
+        <p:blipFill>
+          <a:blip r:embed="rId2"/>
+          <a:stretch>
+            <a:fillRect/>
+          </a:stretch>
+        </p:blipFill>
+        <p:spPr>
+          <a:xfrm>
+            <a:off x="5516080" y="5234506"/>
+            <a:ext cx="2034038" cy="1534177"/>
+          </a:xfrm>
+          <a:prstGeom prst="rect">
+            <a:avLst/>
+          </a:prstGeom>
+        </p:spPr>
+      </p:pic>
+      <p:pic>
+        <p:nvPicPr>
+          <p:cNvPr id="41" name="Picture 40"/>
+          <p:cNvPicPr>
+            <a:picLocks noChangeAspect="1"/>
+          </p:cNvPicPr>
+          <p:nvPr/>
+        </p:nvPicPr>
+        <p:blipFill>
+          <a:blip r:embed="rId3"/>
+          <a:stretch>
+            <a:fillRect/>
+          </a:stretch>
+        </p:blipFill>
+        <p:spPr>
+          <a:xfrm>
+            <a:off x="3511759" y="2133081"/>
+            <a:ext cx="774344" cy="1312911"/>
+          </a:xfrm>
+          <a:prstGeom prst="rect">
+            <a:avLst/>
+          </a:prstGeom>
+        </p:spPr>
+      </p:pic>
+      <p:pic>
+        <p:nvPicPr>
+          <p:cNvPr id="42" name="Picture 41"/>
+          <p:cNvPicPr>
+            <a:picLocks noChangeAspect="1"/>
+          </p:cNvPicPr>
+          <p:nvPr/>
+        </p:nvPicPr>
+        <p:blipFill>
+          <a:blip r:embed="rId3"/>
+          <a:stretch>
+            <a:fillRect/>
+          </a:stretch>
+        </p:blipFill>
+        <p:spPr>
+          <a:xfrm>
+            <a:off x="4887798" y="3683794"/>
+            <a:ext cx="774344" cy="1312911"/>
+          </a:xfrm>
+          <a:prstGeom prst="rect">
+            <a:avLst/>
+          </a:prstGeom>
+        </p:spPr>
+      </p:pic>
+      <p:pic>
+        <p:nvPicPr>
+          <p:cNvPr id="43" name="Picture 42"/>
+          <p:cNvPicPr>
+            <a:picLocks noChangeAspect="1"/>
+          </p:cNvPicPr>
+          <p:nvPr/>
+        </p:nvPicPr>
+        <p:blipFill>
+          <a:blip r:embed="rId3"/>
+          <a:stretch>
+            <a:fillRect/>
+          </a:stretch>
+        </p:blipFill>
+        <p:spPr>
+          <a:xfrm>
+            <a:off x="4887798" y="381300"/>
+            <a:ext cx="774344" cy="1312911"/>
+          </a:xfrm>
+          <a:prstGeom prst="rect">
+            <a:avLst/>
+          </a:prstGeom>
+        </p:spPr>
+      </p:pic>
+      <p:pic>
+        <p:nvPicPr>
+          <p:cNvPr id="44" name="Picture 43"/>
+          <p:cNvPicPr>
+            <a:picLocks noChangeAspect="1"/>
+          </p:cNvPicPr>
+          <p:nvPr/>
+        </p:nvPicPr>
+        <p:blipFill>
+          <a:blip r:embed="rId3"/>
+          <a:stretch>
+            <a:fillRect/>
+          </a:stretch>
+        </p:blipFill>
+        <p:spPr>
+          <a:xfrm>
+            <a:off x="6228326" y="381300"/>
+            <a:ext cx="774344" cy="1312911"/>
+          </a:xfrm>
+          <a:prstGeom prst="rect">
+            <a:avLst/>
+          </a:prstGeom>
+        </p:spPr>
+      </p:pic>
+      <p:cxnSp>
+        <p:nvCxnSpPr>
+          <p:cNvPr id="48" name="Straight Arrow Connector 47"/>
+          <p:cNvCxnSpPr>
+            <a:stCxn id="9" idx="3"/>
+            <a:endCxn id="41" idx="1"/>
+          </p:cNvCxnSpPr>
+          <p:nvPr/>
+        </p:nvCxnSpPr>
+        <p:spPr>
+          <a:xfrm flipV="1">
+            <a:off x="2773931" y="2789537"/>
+            <a:ext cx="737828" cy="1"/>
+          </a:xfrm>
+          <a:prstGeom prst="straightConnector1">
+            <a:avLst/>
+          </a:prstGeom>
+          <a:ln>
+            <a:tailEnd type="triangle"/>
+          </a:ln>
+        </p:spPr>
+        <p:style>
+          <a:lnRef idx="1">
+            <a:schemeClr val="accent1"/>
+          </a:lnRef>
+          <a:fillRef idx="0">
+            <a:schemeClr val="accent1"/>
+          </a:fillRef>
+          <a:effectRef idx="0">
+            <a:schemeClr val="accent1"/>
+          </a:effectRef>
+          <a:fontRef idx="minor">
+            <a:schemeClr val="tx1"/>
+          </a:fontRef>
+        </p:style>
+      </p:cxnSp>
+      <p:cxnSp>
+        <p:nvCxnSpPr>
+          <p:cNvPr id="50" name="Elbow Connector 49"/>
+          <p:cNvCxnSpPr>
+            <a:stCxn id="10" idx="3"/>
+            <a:endCxn id="41" idx="2"/>
+          </p:cNvCxnSpPr>
+          <p:nvPr/>
+        </p:nvCxnSpPr>
+        <p:spPr>
+          <a:xfrm flipV="1">
+            <a:off x="2773931" y="3445992"/>
+            <a:ext cx="1125000" cy="877723"/>
+          </a:xfrm>
+          <a:prstGeom prst="bentConnector2">
+            <a:avLst/>
+          </a:prstGeom>
+          <a:ln>
+            <a:tailEnd type="triangle"/>
+          </a:ln>
+        </p:spPr>
+        <p:style>
+          <a:lnRef idx="1">
+            <a:schemeClr val="accent1"/>
+          </a:lnRef>
+          <a:fillRef idx="0">
+            <a:schemeClr val="accent1"/>
+          </a:fillRef>
+          <a:effectRef idx="0">
+            <a:schemeClr val="accent1"/>
+          </a:effectRef>
+          <a:fontRef idx="minor">
+            <a:schemeClr val="tx1"/>
+          </a:fontRef>
+        </p:style>
+      </p:cxnSp>
+      <p:cxnSp>
+        <p:nvCxnSpPr>
+          <p:cNvPr id="52" name="Elbow Connector 51"/>
+          <p:cNvCxnSpPr>
+            <a:stCxn id="39" idx="0"/>
+            <a:endCxn id="42" idx="1"/>
+          </p:cNvCxnSpPr>
+          <p:nvPr/>
+        </p:nvCxnSpPr>
+        <p:spPr>
+          <a:xfrm rot="5400000" flipH="1" flipV="1">
+            <a:off x="4033763" y="4380471"/>
+            <a:ext cx="894256" cy="813814"/>
+          </a:xfrm>
+          <a:prstGeom prst="bentConnector2">
+            <a:avLst/>
+          </a:prstGeom>
+          <a:ln>
+            <a:tailEnd type="triangle"/>
+          </a:ln>
+        </p:spPr>
+        <p:style>
+          <a:lnRef idx="1">
+            <a:schemeClr val="accent1"/>
+          </a:lnRef>
+          <a:fillRef idx="0">
+            <a:schemeClr val="accent1"/>
+          </a:fillRef>
+          <a:effectRef idx="0">
+            <a:schemeClr val="accent1"/>
+          </a:effectRef>
+          <a:fontRef idx="minor">
+            <a:schemeClr val="tx1"/>
+          </a:fontRef>
+        </p:style>
+      </p:cxnSp>
+      <p:cxnSp>
+        <p:nvCxnSpPr>
+          <p:cNvPr id="54" name="Elbow Connector 53"/>
+          <p:cNvCxnSpPr>
+            <a:stCxn id="40" idx="0"/>
+            <a:endCxn id="42" idx="3"/>
+          </p:cNvCxnSpPr>
+          <p:nvPr/>
+        </p:nvCxnSpPr>
+        <p:spPr>
+          <a:xfrm rot="16200000" flipV="1">
+            <a:off x="5650493" y="4351899"/>
+            <a:ext cx="894256" cy="870957"/>
+          </a:xfrm>
+          <a:prstGeom prst="bentConnector2">
+            <a:avLst/>
+          </a:prstGeom>
+          <a:ln>
+            <a:tailEnd type="triangle"/>
+          </a:ln>
+        </p:spPr>
+        <p:style>
+          <a:lnRef idx="1">
+            <a:schemeClr val="accent1"/>
+          </a:lnRef>
+          <a:fillRef idx="0">
+            <a:schemeClr val="accent1"/>
+          </a:fillRef>
+          <a:effectRef idx="0">
+            <a:schemeClr val="accent1"/>
+          </a:effectRef>
+          <a:fontRef idx="minor">
+            <a:schemeClr val="tx1"/>
+          </a:fontRef>
+        </p:style>
+      </p:cxnSp>
+      <p:sp>
+        <p:nvSpPr>
+          <p:cNvPr id="55" name="Cloud 54"/>
+          <p:cNvSpPr/>
+          <p:nvPr/>
+        </p:nvSpPr>
+        <p:spPr>
+          <a:xfrm>
+            <a:off x="4887798" y="2202271"/>
+            <a:ext cx="2004187" cy="1168778"/>
+          </a:xfrm>
+          <a:prstGeom prst="cloud">
+            <a:avLst/>
+          </a:prstGeom>
+        </p:spPr>
+        <p:style>
+          <a:lnRef idx="2">
+            <a:schemeClr val="accent1">
+              <a:shade val="50000"/>
+            </a:schemeClr>
+          </a:lnRef>
+          <a:fillRef idx="1">
+            <a:schemeClr val="accent1"/>
+          </a:fillRef>
+          <a:effectRef idx="0">
+            <a:schemeClr val="accent1"/>
+          </a:effectRef>
+          <a:fontRef idx="minor">
+            <a:schemeClr val="lt1"/>
+          </a:fontRef>
+        </p:style>
+        <p:txBody>
+          <a:bodyPr rtlCol="0" anchor="ctr"/>
+          <a:lstStyle/>
+          <a:p>
+            <a:pPr algn="ctr"/>
+            <a:r>
+              <a:rPr lang="en-US" b="1" dirty="0" smtClean="0"/>
+              <a:t>ES Cluster</a:t>
+            </a:r>
+            <a:endParaRPr lang="en-US" b="1" dirty="0"/>
+          </a:p>
+        </p:txBody>
+      </p:sp>
+      <p:cxnSp>
+        <p:nvCxnSpPr>
+          <p:cNvPr id="57" name="Elbow Connector 56"/>
+          <p:cNvCxnSpPr>
+            <a:stCxn id="43" idx="2"/>
+            <a:endCxn id="55" idx="3"/>
+          </p:cNvCxnSpPr>
+          <p:nvPr/>
+        </p:nvCxnSpPr>
+        <p:spPr>
+          <a:xfrm rot="16200000" flipH="1">
+            <a:off x="5294988" y="1674193"/>
+            <a:ext cx="574886" cy="614922"/>
+          </a:xfrm>
+          <a:prstGeom prst="bentConnector3">
+            <a:avLst/>
+          </a:prstGeom>
+          <a:ln>
+            <a:tailEnd type="triangle"/>
+          </a:ln>
+        </p:spPr>
+        <p:style>
+          <a:lnRef idx="1">
+            <a:schemeClr val="accent1"/>
+          </a:lnRef>
+          <a:fillRef idx="0">
+            <a:schemeClr val="accent1"/>
+          </a:fillRef>
+          <a:effectRef idx="0">
+            <a:schemeClr val="accent1"/>
+          </a:effectRef>
+          <a:fontRef idx="minor">
+            <a:schemeClr val="tx1"/>
+          </a:fontRef>
+        </p:style>
+      </p:cxnSp>
+      <p:cxnSp>
+        <p:nvCxnSpPr>
+          <p:cNvPr id="59" name="Elbow Connector 58"/>
+          <p:cNvCxnSpPr>
+            <a:stCxn id="44" idx="2"/>
+            <a:endCxn id="55" idx="3"/>
+          </p:cNvCxnSpPr>
+          <p:nvPr/>
+        </p:nvCxnSpPr>
+        <p:spPr>
+          <a:xfrm rot="5400000">
+            <a:off x="5965252" y="1618851"/>
+            <a:ext cx="574886" cy="725606"/>
+          </a:xfrm>
+          <a:prstGeom prst="bentConnector3">
+            <a:avLst/>
+          </a:prstGeom>
+          <a:ln>
+            <a:tailEnd type="triangle"/>
+          </a:ln>
+        </p:spPr>
+        <p:style>
+          <a:lnRef idx="1">
+            <a:schemeClr val="accent1"/>
+          </a:lnRef>
+          <a:fillRef idx="0">
+            <a:schemeClr val="accent1"/>
+          </a:fillRef>
+          <a:effectRef idx="0">
+            <a:schemeClr val="accent1"/>
+          </a:effectRef>
+          <a:fontRef idx="minor">
+            <a:schemeClr val="tx1"/>
+          </a:fontRef>
+        </p:style>
+      </p:cxnSp>
+      <p:cxnSp>
+        <p:nvCxnSpPr>
+          <p:cNvPr id="61" name="Elbow Connector 60"/>
+          <p:cNvCxnSpPr>
+            <a:stCxn id="41" idx="3"/>
+            <a:endCxn id="55" idx="2"/>
+          </p:cNvCxnSpPr>
+          <p:nvPr/>
+        </p:nvCxnSpPr>
+        <p:spPr>
+          <a:xfrm flipV="1">
+            <a:off x="4286103" y="2786660"/>
+            <a:ext cx="607912" cy="2877"/>
+          </a:xfrm>
+          <a:prstGeom prst="bentConnector3">
+            <a:avLst/>
+          </a:prstGeom>
+          <a:ln>
+            <a:tailEnd type="triangle"/>
+          </a:ln>
+        </p:spPr>
+        <p:style>
+          <a:lnRef idx="1">
+            <a:schemeClr val="accent1"/>
+          </a:lnRef>
+          <a:fillRef idx="0">
+            <a:schemeClr val="accent1"/>
+          </a:fillRef>
+          <a:effectRef idx="0">
+            <a:schemeClr val="accent1"/>
+          </a:effectRef>
+          <a:fontRef idx="minor">
+            <a:schemeClr val="tx1"/>
+          </a:fontRef>
+        </p:style>
+      </p:cxnSp>
+      <p:cxnSp>
+        <p:nvCxnSpPr>
+          <p:cNvPr id="63" name="Elbow Connector 62"/>
+          <p:cNvCxnSpPr>
+            <a:stCxn id="42" idx="0"/>
+            <a:endCxn id="55" idx="1"/>
+          </p:cNvCxnSpPr>
+          <p:nvPr/>
+        </p:nvCxnSpPr>
+        <p:spPr>
+          <a:xfrm rot="5400000" flipH="1" flipV="1">
+            <a:off x="5425436" y="3219338"/>
+            <a:ext cx="313990" cy="614922"/>
+          </a:xfrm>
+          <a:prstGeom prst="bentConnector3">
+            <a:avLst/>
+          </a:prstGeom>
+          <a:ln>
+            <a:tailEnd type="triangle"/>
+          </a:ln>
+        </p:spPr>
+        <p:style>
+          <a:lnRef idx="1">
+            <a:schemeClr val="accent1"/>
+          </a:lnRef>
+          <a:fillRef idx="0">
+            <a:schemeClr val="accent1"/>
+          </a:fillRef>
+          <a:effectRef idx="0">
+            <a:schemeClr val="accent1"/>
+          </a:effectRef>
+          <a:fontRef idx="minor">
+            <a:schemeClr val="tx1"/>
+          </a:fontRef>
+        </p:style>
+      </p:cxnSp>
+      <p:sp>
+        <p:nvSpPr>
+          <p:cNvPr id="64" name="Rectangle 63"/>
+          <p:cNvSpPr/>
+          <p:nvPr/>
+        </p:nvSpPr>
+        <p:spPr>
+          <a:xfrm rot="5400000">
+            <a:off x="7161380" y="2543860"/>
+            <a:ext cx="1821662" cy="551348"/>
+          </a:xfrm>
+          <a:prstGeom prst="rect">
+            <a:avLst/>
+          </a:prstGeom>
+        </p:spPr>
+        <p:style>
+          <a:lnRef idx="2">
+            <a:schemeClr val="accent1">
+              <a:shade val="50000"/>
+            </a:schemeClr>
+          </a:lnRef>
+          <a:fillRef idx="1">
+            <a:schemeClr val="accent1"/>
+          </a:fillRef>
+          <a:effectRef idx="0">
+            <a:schemeClr val="accent1"/>
+          </a:effectRef>
+          <a:fontRef idx="minor">
+            <a:schemeClr val="lt1"/>
+          </a:fontRef>
+        </p:style>
+        <p:txBody>
+          <a:bodyPr rtlCol="0" anchor="ctr"/>
+          <a:lstStyle/>
+          <a:p>
+            <a:pPr algn="ctr"/>
+            <a:r>
+              <a:rPr lang="en-US" dirty="0" smtClean="0"/>
+              <a:t>Sensor Data API</a:t>
+            </a:r>
+            <a:endParaRPr lang="en-US" dirty="0"/>
+          </a:p>
+        </p:txBody>
+      </p:sp>
+      <p:sp>
+        <p:nvSpPr>
+          <p:cNvPr id="65" name="Left-Right Arrow 64"/>
+          <p:cNvSpPr/>
+          <p:nvPr/>
+        </p:nvSpPr>
+        <p:spPr>
+          <a:xfrm>
+            <a:off x="8347885" y="2622887"/>
+            <a:ext cx="893768" cy="327545"/>
+          </a:xfrm>
+          <a:prstGeom prst="leftRightArrow">
+            <a:avLst/>
+          </a:prstGeom>
+        </p:spPr>
+        <p:style>
+          <a:lnRef idx="1">
+            <a:schemeClr val="dk1"/>
+          </a:lnRef>
+          <a:fillRef idx="3">
+            <a:schemeClr val="dk1"/>
+          </a:fillRef>
+          <a:effectRef idx="2">
+            <a:schemeClr val="dk1"/>
+          </a:effectRef>
+          <a:fontRef idx="minor">
+            <a:schemeClr val="lt1"/>
+          </a:fontRef>
+        </p:style>
+        <p:txBody>
+          <a:bodyPr rtlCol="0" anchor="ctr"/>
+          <a:lstStyle/>
+          <a:p>
+            <a:pPr algn="ctr"/>
+            <a:endParaRPr lang="en-US"/>
+          </a:p>
+        </p:txBody>
+      </p:sp>
+      <p:sp>
+        <p:nvSpPr>
+          <p:cNvPr id="66" name="Left-Right Arrow 65"/>
+          <p:cNvSpPr/>
+          <p:nvPr/>
+        </p:nvSpPr>
+        <p:spPr>
+          <a:xfrm>
+            <a:off x="6891985" y="2622886"/>
+            <a:ext cx="893768" cy="327545"/>
+          </a:xfrm>
+          <a:prstGeom prst="leftRightArrow">
+            <a:avLst/>
+          </a:prstGeom>
+        </p:spPr>
+        <p:style>
+          <a:lnRef idx="1">
+            <a:schemeClr val="dk1"/>
+          </a:lnRef>
+          <a:fillRef idx="3">
+            <a:schemeClr val="dk1"/>
+          </a:fillRef>
+          <a:effectRef idx="2">
+            <a:schemeClr val="dk1"/>
+          </a:effectRef>
+          <a:fontRef idx="minor">
+            <a:schemeClr val="lt1"/>
+          </a:fontRef>
+        </p:style>
+        <p:txBody>
+          <a:bodyPr rtlCol="0" anchor="ctr"/>
+          <a:lstStyle/>
+          <a:p>
+            <a:pPr algn="ctr"/>
+            <a:endParaRPr lang="en-US"/>
+          </a:p>
+        </p:txBody>
+      </p:sp>
+      <p:sp>
+        <p:nvSpPr>
+          <p:cNvPr id="4" name="Title 3"/>
+          <p:cNvSpPr>
+            <a:spLocks noGrp="1"/>
+          </p:cNvSpPr>
+          <p:nvPr>
+            <p:ph type="title"/>
+          </p:nvPr>
+        </p:nvSpPr>
+        <p:spPr>
+          <a:xfrm>
+            <a:off x="839821" y="294283"/>
+            <a:ext cx="10515600" cy="707048"/>
+          </a:xfrm>
+        </p:spPr>
+        <p:txBody>
+          <a:bodyPr>
+            <a:normAutofit/>
+          </a:bodyPr>
+          <a:lstStyle/>
+          <a:p>
+            <a:r>
+              <a:rPr lang="en-US" sz="3600" dirty="0" smtClean="0"/>
+              <a:t>Log Aggregation</a:t>
+            </a:r>
+            <a:endParaRPr lang="en-US" sz="3600" dirty="0"/>
+          </a:p>
+        </p:txBody>
+      </p:sp>
+      <p:sp>
+        <p:nvSpPr>
+          <p:cNvPr id="29" name="Action Button: Home 28">
+            <a:hlinkClick r:id="rId4" action="ppaction://hlinksldjump" highlightClick="1"/>
+          </p:cNvPr>
+          <p:cNvSpPr/>
+          <p:nvPr/>
+        </p:nvSpPr>
+        <p:spPr>
+          <a:xfrm>
+            <a:off x="11660863" y="188793"/>
+            <a:ext cx="352663" cy="352663"/>
+          </a:xfrm>
+          <a:prstGeom prst="actionButtonHome">
+            <a:avLst/>
+          </a:prstGeom>
+        </p:spPr>
+        <p:style>
+          <a:lnRef idx="2">
+            <a:schemeClr val="dk1"/>
+          </a:lnRef>
+          <a:fillRef idx="1">
+            <a:schemeClr val="lt1"/>
+          </a:fillRef>
+          <a:effectRef idx="0">
+            <a:schemeClr val="dk1"/>
+          </a:effectRef>
+          <a:fontRef idx="minor">
+            <a:schemeClr val="dk1"/>
+          </a:fontRef>
+        </p:style>
+        <p:txBody>
+          <a:bodyPr rtlCol="0" anchor="ctr"/>
+          <a:lstStyle/>
+          <a:p>
+            <a:pPr algn="ctr"/>
+            <a:endParaRPr lang="en-US"/>
+          </a:p>
+        </p:txBody>
+      </p:sp>
+    </p:spTree>
+    <p:extLst>
+      <p:ext uri="{BB962C8B-B14F-4D97-AF65-F5344CB8AC3E}">
+        <p14:creationId xmlns:p14="http://schemas.microsoft.com/office/powerpoint/2010/main" val="3140183925"/>
+      </p:ext>
+    </p:extLst>
+  </p:cSld>
+  <p:clrMapOvr>
+    <a:masterClrMapping/>
+  </p:clrMapOvr>
+  <p:timing>
+    <p:tnLst>
+      <p:par>
+        <p:cTn id="1" dur="indefinite" restart="never" nodeType="tmRoot"/>
+      </p:par>
+    </p:tnLst>
+  </p:timing>
+</p:sld>
+</file>
+
+<file path=ppt/slides/slide11.xml><?xml version="1.0" encoding="utf-8"?>
+<p:sld xmlns:a="http://schemas.openxmlformats.org/drawingml/2006/main" xmlns:r="http://schemas.openxmlformats.org/officeDocument/2006/relationships" xmlns:p="http://schemas.openxmlformats.org/presentationml/2006/main">
+  <p:cSld>
+    <p:spTree>
+      <p:nvGrpSpPr>
+        <p:cNvPr id="1" name=""/>
+        <p:cNvGrpSpPr/>
+        <p:nvPr/>
+      </p:nvGrpSpPr>
+      <p:grpSpPr>
+        <a:xfrm>
+          <a:off x="0" y="0"/>
+          <a:ext cx="0" cy="0"/>
+          <a:chOff x="0" y="0"/>
+          <a:chExt cx="0" cy="0"/>
+        </a:xfrm>
+      </p:grpSpPr>
+      <p:sp>
+        <p:nvSpPr>
           <p:cNvPr id="16" name="Bent Arrow 15"/>
           <p:cNvSpPr/>
           <p:nvPr/>
@@ -6965,11 +7762,41 @@
                 <a:tableStyleId>{5C22544A-7EE6-4342-B048-85BDC9FD1C3A}</a:tableStyleId>
               </a:tblPr>
               <a:tblGrid>
-                <a:gridCol w="743156"/>
-                <a:gridCol w="1281960"/>
-                <a:gridCol w="1118775"/>
-                <a:gridCol w="1118775"/>
-                <a:gridCol w="1118775"/>
+                <a:gridCol w="743156">
+                  <a:extLst>
+                    <a:ext uri="{9D8B030D-6E8A-4147-A177-3AD203B41FA5}">
+                      <a16:colId xmlns:a16="http://schemas.microsoft.com/office/drawing/2014/main" val="20000"/>
+                    </a:ext>
+                  </a:extLst>
+                </a:gridCol>
+                <a:gridCol w="1281960">
+                  <a:extLst>
+                    <a:ext uri="{9D8B030D-6E8A-4147-A177-3AD203B41FA5}">
+                      <a16:colId xmlns:a16="http://schemas.microsoft.com/office/drawing/2014/main" val="20001"/>
+                    </a:ext>
+                  </a:extLst>
+                </a:gridCol>
+                <a:gridCol w="1118775">
+                  <a:extLst>
+                    <a:ext uri="{9D8B030D-6E8A-4147-A177-3AD203B41FA5}">
+                      <a16:colId xmlns:a16="http://schemas.microsoft.com/office/drawing/2014/main" val="20002"/>
+                    </a:ext>
+                  </a:extLst>
+                </a:gridCol>
+                <a:gridCol w="1118775">
+                  <a:extLst>
+                    <a:ext uri="{9D8B030D-6E8A-4147-A177-3AD203B41FA5}">
+                      <a16:colId xmlns:a16="http://schemas.microsoft.com/office/drawing/2014/main" val="20003"/>
+                    </a:ext>
+                  </a:extLst>
+                </a:gridCol>
+                <a:gridCol w="1118775">
+                  <a:extLst>
+                    <a:ext uri="{9D8B030D-6E8A-4147-A177-3AD203B41FA5}">
+                      <a16:colId xmlns:a16="http://schemas.microsoft.com/office/drawing/2014/main" val="20004"/>
+                    </a:ext>
+                  </a:extLst>
+                </a:gridCol>
               </a:tblGrid>
               <a:tr h="278130">
                 <a:tc>
@@ -7042,6 +7869,11 @@
                   </a:txBody>
                   <a:tcPr marL="68580" marR="68580" marT="34290" marB="34290"/>
                 </a:tc>
+                <a:extLst>
+                  <a:ext uri="{0D108BD9-81ED-4DB2-BD59-A6C34878D82A}">
+                    <a16:rowId xmlns:a16="http://schemas.microsoft.com/office/drawing/2014/main" val="10000"/>
+                  </a:ext>
+                </a:extLst>
               </a:tr>
               <a:tr h="278130">
                 <a:tc>
@@ -7114,6 +7946,11 @@
                   </a:txBody>
                   <a:tcPr marL="68580" marR="68580" marT="34290" marB="34290"/>
                 </a:tc>
+                <a:extLst>
+                  <a:ext uri="{0D108BD9-81ED-4DB2-BD59-A6C34878D82A}">
+                    <a16:rowId xmlns:a16="http://schemas.microsoft.com/office/drawing/2014/main" val="10001"/>
+                  </a:ext>
+                </a:extLst>
               </a:tr>
               <a:tr h="278130">
                 <a:tc>
@@ -7186,6 +8023,11 @@
                   </a:txBody>
                   <a:tcPr marL="68580" marR="68580" marT="34290" marB="34290"/>
                 </a:tc>
+                <a:extLst>
+                  <a:ext uri="{0D108BD9-81ED-4DB2-BD59-A6C34878D82A}">
+                    <a16:rowId xmlns:a16="http://schemas.microsoft.com/office/drawing/2014/main" val="10002"/>
+                  </a:ext>
+                </a:extLst>
               </a:tr>
               <a:tr h="278130">
                 <a:tc>
@@ -7258,6 +8100,11 @@
                   </a:txBody>
                   <a:tcPr marL="68580" marR="68580" marT="34290" marB="34290"/>
                 </a:tc>
+                <a:extLst>
+                  <a:ext uri="{0D108BD9-81ED-4DB2-BD59-A6C34878D82A}">
+                    <a16:rowId xmlns:a16="http://schemas.microsoft.com/office/drawing/2014/main" val="10003"/>
+                  </a:ext>
+                </a:extLst>
               </a:tr>
             </a:tbl>
           </a:graphicData>
@@ -7317,11 +8164,41 @@
                 <a:tableStyleId>{5C22544A-7EE6-4342-B048-85BDC9FD1C3A}</a:tableStyleId>
               </a:tblPr>
               <a:tblGrid>
-                <a:gridCol w="743156"/>
-                <a:gridCol w="1281960"/>
-                <a:gridCol w="1118776"/>
-                <a:gridCol w="1118776"/>
-                <a:gridCol w="1118776"/>
+                <a:gridCol w="743156">
+                  <a:extLst>
+                    <a:ext uri="{9D8B030D-6E8A-4147-A177-3AD203B41FA5}">
+                      <a16:colId xmlns:a16="http://schemas.microsoft.com/office/drawing/2014/main" val="20000"/>
+                    </a:ext>
+                  </a:extLst>
+                </a:gridCol>
+                <a:gridCol w="1281960">
+                  <a:extLst>
+                    <a:ext uri="{9D8B030D-6E8A-4147-A177-3AD203B41FA5}">
+                      <a16:colId xmlns:a16="http://schemas.microsoft.com/office/drawing/2014/main" val="20001"/>
+                    </a:ext>
+                  </a:extLst>
+                </a:gridCol>
+                <a:gridCol w="1118776">
+                  <a:extLst>
+                    <a:ext uri="{9D8B030D-6E8A-4147-A177-3AD203B41FA5}">
+                      <a16:colId xmlns:a16="http://schemas.microsoft.com/office/drawing/2014/main" val="20002"/>
+                    </a:ext>
+                  </a:extLst>
+                </a:gridCol>
+                <a:gridCol w="1118776">
+                  <a:extLst>
+                    <a:ext uri="{9D8B030D-6E8A-4147-A177-3AD203B41FA5}">
+                      <a16:colId xmlns:a16="http://schemas.microsoft.com/office/drawing/2014/main" val="20003"/>
+                    </a:ext>
+                  </a:extLst>
+                </a:gridCol>
+                <a:gridCol w="1118776">
+                  <a:extLst>
+                    <a:ext uri="{9D8B030D-6E8A-4147-A177-3AD203B41FA5}">
+                      <a16:colId xmlns:a16="http://schemas.microsoft.com/office/drawing/2014/main" val="20004"/>
+                    </a:ext>
+                  </a:extLst>
+                </a:gridCol>
               </a:tblGrid>
               <a:tr h="278130">
                 <a:tc>
@@ -7394,6 +8271,11 @@
                   </a:txBody>
                   <a:tcPr marL="68580" marR="68580" marT="34290" marB="34290"/>
                 </a:tc>
+                <a:extLst>
+                  <a:ext uri="{0D108BD9-81ED-4DB2-BD59-A6C34878D82A}">
+                    <a16:rowId xmlns:a16="http://schemas.microsoft.com/office/drawing/2014/main" val="10000"/>
+                  </a:ext>
+                </a:extLst>
               </a:tr>
               <a:tr h="278130">
                 <a:tc>
@@ -7482,6 +8364,11 @@
                   </a:txBody>
                   <a:tcPr marL="68580" marR="68580" marT="34290" marB="34290"/>
                 </a:tc>
+                <a:extLst>
+                  <a:ext uri="{0D108BD9-81ED-4DB2-BD59-A6C34878D82A}">
+                    <a16:rowId xmlns:a16="http://schemas.microsoft.com/office/drawing/2014/main" val="10001"/>
+                  </a:ext>
+                </a:extLst>
               </a:tr>
               <a:tr h="278130">
                 <a:tc>
@@ -7554,6 +8441,11 @@
                   </a:txBody>
                   <a:tcPr marL="68580" marR="68580" marT="34290" marB="34290"/>
                 </a:tc>
+                <a:extLst>
+                  <a:ext uri="{0D108BD9-81ED-4DB2-BD59-A6C34878D82A}">
+                    <a16:rowId xmlns:a16="http://schemas.microsoft.com/office/drawing/2014/main" val="10002"/>
+                  </a:ext>
+                </a:extLst>
               </a:tr>
               <a:tr h="278130">
                 <a:tc>
@@ -7626,6 +8518,11 @@
                   </a:txBody>
                   <a:tcPr marL="68580" marR="68580" marT="34290" marB="34290"/>
                 </a:tc>
+                <a:extLst>
+                  <a:ext uri="{0D108BD9-81ED-4DB2-BD59-A6C34878D82A}">
+                    <a16:rowId xmlns:a16="http://schemas.microsoft.com/office/drawing/2014/main" val="10003"/>
+                  </a:ext>
+                </a:extLst>
               </a:tr>
             </a:tbl>
           </a:graphicData>
@@ -7998,7 +8895,7 @@
 </p:sld>
 </file>
 
-<file path=ppt/slides/slide11.xml><?xml version="1.0" encoding="utf-8"?>
+<file path=ppt/slides/slide12.xml><?xml version="1.0" encoding="utf-8"?>
 <p:sld xmlns:a="http://schemas.openxmlformats.org/drawingml/2006/main" xmlns:r="http://schemas.openxmlformats.org/officeDocument/2006/relationships" xmlns:p="http://schemas.openxmlformats.org/presentationml/2006/main">
   <p:cSld>
     <p:spTree>
@@ -10014,7 +10911,7 @@
 </p:sld>
 </file>
 
-<file path=ppt/slides/slide12.xml><?xml version="1.0" encoding="utf-8"?>
+<file path=ppt/slides/slide13.xml><?xml version="1.0" encoding="utf-8"?>
 <p:sld xmlns:a="http://schemas.openxmlformats.org/drawingml/2006/main" xmlns:r="http://schemas.openxmlformats.org/officeDocument/2006/relationships" xmlns:p="http://schemas.openxmlformats.org/presentationml/2006/main">
   <p:cSld>
     <p:spTree>
@@ -10879,7 +11776,7 @@
 </p:sld>
 </file>
 
-<file path=ppt/slides/slide13.xml><?xml version="1.0" encoding="utf-8"?>
+<file path=ppt/slides/slide14.xml><?xml version="1.0" encoding="utf-8"?>
 <p:sld xmlns:a="http://schemas.openxmlformats.org/drawingml/2006/main" xmlns:r="http://schemas.openxmlformats.org/officeDocument/2006/relationships" xmlns:p="http://schemas.openxmlformats.org/presentationml/2006/main">
   <p:cSld>
     <p:spTree>
@@ -12403,7 +13300,7 @@
 </p:sld>
 </file>
 
-<file path=ppt/slides/slide14.xml><?xml version="1.0" encoding="utf-8"?>
+<file path=ppt/slides/slide15.xml><?xml version="1.0" encoding="utf-8"?>
 <p:sld xmlns:a="http://schemas.openxmlformats.org/drawingml/2006/main" xmlns:r="http://schemas.openxmlformats.org/officeDocument/2006/relationships" xmlns:p="http://schemas.openxmlformats.org/presentationml/2006/main">
   <p:cSld>
     <p:spTree>
@@ -13180,7 +14077,7 @@
 </p:sld>
 </file>
 
-<file path=ppt/slides/slide15.xml><?xml version="1.0" encoding="utf-8"?>
+<file path=ppt/slides/slide16.xml><?xml version="1.0" encoding="utf-8"?>
 <p:sld xmlns:a="http://schemas.openxmlformats.org/drawingml/2006/main" xmlns:r="http://schemas.openxmlformats.org/officeDocument/2006/relationships" xmlns:p="http://schemas.openxmlformats.org/presentationml/2006/main">
   <p:cSld>
     <p:spTree>
@@ -14297,7 +15194,7 @@
 </p:sld>
 </file>
 
-<file path=ppt/slides/slide16.xml><?xml version="1.0" encoding="utf-8"?>
+<file path=ppt/slides/slide17.xml><?xml version="1.0" encoding="utf-8"?>
 <p:sld xmlns:a="http://schemas.openxmlformats.org/drawingml/2006/main" xmlns:r="http://schemas.openxmlformats.org/officeDocument/2006/relationships" xmlns:p="http://schemas.openxmlformats.org/presentationml/2006/main">
   <p:cSld>
     <p:spTree>
@@ -14394,7 +15291,7 @@
           <p:cNvPr id="5" name="Title 4">
             <a:extLst>
               <a:ext uri="{FF2B5EF4-FFF2-40B4-BE49-F238E27FC236}">
-                <a16:creationId xmlns="" xmlns:a16="http://schemas.microsoft.com/office/drawing/2014/main" id="{DCFEA0F0-E058-244A-822C-4A659AFED579}"/>
+                <a16:creationId xmlns:a16="http://schemas.microsoft.com/office/drawing/2014/main" id="{DCFEA0F0-E058-244A-822C-4A659AFED579}"/>
               </a:ext>
             </a:extLst>
           </p:cNvPr>
@@ -14424,7 +15321,7 @@
           <p:cNvPr id="3" name="Slide Number Placeholder 2">
             <a:extLst>
               <a:ext uri="{FF2B5EF4-FFF2-40B4-BE49-F238E27FC236}">
-                <a16:creationId xmlns="" xmlns:a16="http://schemas.microsoft.com/office/drawing/2014/main" id="{55B33B8F-93A0-F54E-80B8-7CA51E4EBE17}"/>
+                <a16:creationId xmlns:a16="http://schemas.microsoft.com/office/drawing/2014/main" id="{55B33B8F-93A0-F54E-80B8-7CA51E4EBE17}"/>
               </a:ext>
             </a:extLst>
           </p:cNvPr>
@@ -18102,6 +18999,1464 @@
           <a:p>
             <a:r>
               <a:rPr lang="en-US" dirty="0" smtClean="0"/>
+              <a:t>System Architecture</a:t>
+            </a:r>
+            <a:endParaRPr lang="en-US" dirty="0"/>
+          </a:p>
+        </p:txBody>
+      </p:sp>
+      <p:sp>
+        <p:nvSpPr>
+          <p:cNvPr id="4" name="Cloud 3"/>
+          <p:cNvSpPr/>
+          <p:nvPr/>
+        </p:nvSpPr>
+        <p:spPr>
+          <a:xfrm>
+            <a:off x="1836076" y="1323975"/>
+            <a:ext cx="7384124" cy="5324475"/>
+          </a:xfrm>
+          <a:prstGeom prst="cloud">
+            <a:avLst/>
+          </a:prstGeom>
+          <a:noFill/>
+        </p:spPr>
+        <p:style>
+          <a:lnRef idx="2">
+            <a:schemeClr val="dk1"/>
+          </a:lnRef>
+          <a:fillRef idx="1">
+            <a:schemeClr val="lt1"/>
+          </a:fillRef>
+          <a:effectRef idx="0">
+            <a:schemeClr val="dk1"/>
+          </a:effectRef>
+          <a:fontRef idx="minor">
+            <a:schemeClr val="dk1"/>
+          </a:fontRef>
+        </p:style>
+        <p:txBody>
+          <a:bodyPr rtlCol="0" anchor="ctr"/>
+          <a:lstStyle/>
+          <a:p>
+            <a:pPr algn="ctr"/>
+            <a:endParaRPr lang="en-US"/>
+          </a:p>
+        </p:txBody>
+      </p:sp>
+      <p:pic>
+        <p:nvPicPr>
+          <p:cNvPr id="5" name="Content Placeholder 6"/>
+          <p:cNvPicPr>
+            <a:picLocks noGrp="1" noChangeAspect="1"/>
+          </p:cNvPicPr>
+          <p:nvPr>
+            <p:ph idx="1"/>
+          </p:nvPr>
+        </p:nvPicPr>
+        <p:blipFill>
+          <a:blip r:embed="rId2" cstate="print">
+            <a:grayscl/>
+            <a:extLst>
+              <a:ext uri="{28A0092B-C50C-407E-A947-70E740481C1C}">
+                <a14:useLocalDpi xmlns:a14="http://schemas.microsoft.com/office/drawing/2010/main" val="0"/>
+              </a:ext>
+            </a:extLst>
+          </a:blip>
+          <a:stretch>
+            <a:fillRect/>
+          </a:stretch>
+        </p:blipFill>
+        <p:spPr>
+          <a:xfrm>
+            <a:off x="10832250" y="5395850"/>
+            <a:ext cx="826342" cy="797542"/>
+          </a:xfrm>
+        </p:spPr>
+      </p:pic>
+      <p:sp>
+        <p:nvSpPr>
+          <p:cNvPr id="6" name="TextBox 5"/>
+          <p:cNvSpPr txBox="1"/>
+          <p:nvPr/>
+        </p:nvSpPr>
+        <p:spPr>
+          <a:xfrm>
+            <a:off x="10936682" y="6193392"/>
+            <a:ext cx="617477" cy="369332"/>
+          </a:xfrm>
+          <a:prstGeom prst="rect">
+            <a:avLst/>
+          </a:prstGeom>
+          <a:noFill/>
+        </p:spPr>
+        <p:txBody>
+          <a:bodyPr wrap="none" rtlCol="0">
+            <a:spAutoFit/>
+          </a:bodyPr>
+          <a:lstStyle/>
+          <a:p>
+            <a:r>
+              <a:rPr lang="en-US" dirty="0" smtClean="0"/>
+              <a:t>User</a:t>
+            </a:r>
+            <a:endParaRPr lang="en-US" dirty="0"/>
+          </a:p>
+        </p:txBody>
+      </p:sp>
+      <p:pic>
+        <p:nvPicPr>
+          <p:cNvPr id="7" name="Picture 6" descr="Laptop transparent PNG image"/>
+          <p:cNvPicPr>
+            <a:picLocks noChangeAspect="1"/>
+          </p:cNvPicPr>
+          <p:nvPr/>
+        </p:nvPicPr>
+        <p:blipFill>
+          <a:blip r:embed="rId3" cstate="print">
+            <a:extLst>
+              <a:ext uri="{28A0092B-C50C-407E-A947-70E740481C1C}">
+                <a14:useLocalDpi xmlns:a14="http://schemas.microsoft.com/office/drawing/2010/main" val="0"/>
+              </a:ext>
+            </a:extLst>
+          </a:blip>
+          <a:stretch>
+            <a:fillRect/>
+          </a:stretch>
+        </p:blipFill>
+        <p:spPr>
+          <a:xfrm>
+            <a:off x="8565254" y="5199174"/>
+            <a:ext cx="2214780" cy="1363550"/>
+          </a:xfrm>
+          <a:prstGeom prst="rect">
+            <a:avLst/>
+          </a:prstGeom>
+        </p:spPr>
+      </p:pic>
+      <p:grpSp>
+        <p:nvGrpSpPr>
+          <p:cNvPr id="24" name="Group 23"/>
+          <p:cNvGrpSpPr/>
+          <p:nvPr/>
+        </p:nvGrpSpPr>
+        <p:grpSpPr>
+          <a:xfrm>
+            <a:off x="6095997" y="4476749"/>
+            <a:ext cx="1266826" cy="1152516"/>
+            <a:chOff x="6095997" y="4476749"/>
+            <a:chExt cx="1266826" cy="1152516"/>
+          </a:xfrm>
+        </p:grpSpPr>
+        <p:sp>
+          <p:nvSpPr>
+            <p:cNvPr id="17" name="Rectangle 16"/>
+            <p:cNvSpPr/>
+            <p:nvPr/>
+          </p:nvSpPr>
+          <p:spPr>
+            <a:xfrm>
+              <a:off x="6095997" y="4476749"/>
+              <a:ext cx="1266825" cy="1152515"/>
+            </a:xfrm>
+            <a:prstGeom prst="rect">
+              <a:avLst/>
+            </a:prstGeom>
+          </p:spPr>
+          <p:style>
+            <a:lnRef idx="2">
+              <a:schemeClr val="dk1"/>
+            </a:lnRef>
+            <a:fillRef idx="1">
+              <a:schemeClr val="lt1"/>
+            </a:fillRef>
+            <a:effectRef idx="0">
+              <a:schemeClr val="dk1"/>
+            </a:effectRef>
+            <a:fontRef idx="minor">
+              <a:schemeClr val="dk1"/>
+            </a:fontRef>
+          </p:style>
+          <p:txBody>
+            <a:bodyPr rtlCol="0" anchor="ctr"/>
+            <a:lstStyle/>
+            <a:p>
+              <a:pPr algn="ctr"/>
+              <a:endParaRPr lang="en-US"/>
+            </a:p>
+          </p:txBody>
+        </p:sp>
+        <p:sp>
+          <p:nvSpPr>
+            <p:cNvPr id="18" name="Rectangle 17"/>
+            <p:cNvSpPr/>
+            <p:nvPr/>
+          </p:nvSpPr>
+          <p:spPr>
+            <a:xfrm>
+              <a:off x="6095998" y="5257790"/>
+              <a:ext cx="1266825" cy="371475"/>
+            </a:xfrm>
+            <a:prstGeom prst="rect">
+              <a:avLst/>
+            </a:prstGeom>
+          </p:spPr>
+          <p:style>
+            <a:lnRef idx="2">
+              <a:schemeClr val="dk1">
+                <a:shade val="50000"/>
+              </a:schemeClr>
+            </a:lnRef>
+            <a:fillRef idx="1">
+              <a:schemeClr val="dk1"/>
+            </a:fillRef>
+            <a:effectRef idx="0">
+              <a:schemeClr val="dk1"/>
+            </a:effectRef>
+            <a:fontRef idx="minor">
+              <a:schemeClr val="lt1"/>
+            </a:fontRef>
+          </p:style>
+          <p:txBody>
+            <a:bodyPr rtlCol="0" anchor="ctr"/>
+            <a:lstStyle/>
+            <a:p>
+              <a:pPr algn="ctr"/>
+              <a:r>
+                <a:rPr lang="en-US" dirty="0" smtClean="0"/>
+                <a:t>Nested HV</a:t>
+              </a:r>
+              <a:endParaRPr lang="en-US" dirty="0"/>
+            </a:p>
+          </p:txBody>
+        </p:sp>
+      </p:grpSp>
+      <p:sp>
+        <p:nvSpPr>
+          <p:cNvPr id="21" name="Rectangle 20"/>
+          <p:cNvSpPr/>
+          <p:nvPr/>
+        </p:nvSpPr>
+        <p:spPr>
+          <a:xfrm>
+            <a:off x="6777529" y="4588661"/>
+            <a:ext cx="476251" cy="581025"/>
+          </a:xfrm>
+          <a:prstGeom prst="rect">
+            <a:avLst/>
+          </a:prstGeom>
+        </p:spPr>
+        <p:style>
+          <a:lnRef idx="1">
+            <a:schemeClr val="accent3"/>
+          </a:lnRef>
+          <a:fillRef idx="2">
+            <a:schemeClr val="accent3"/>
+          </a:fillRef>
+          <a:effectRef idx="1">
+            <a:schemeClr val="accent3"/>
+          </a:effectRef>
+          <a:fontRef idx="minor">
+            <a:schemeClr val="dk1"/>
+          </a:fontRef>
+        </p:style>
+        <p:txBody>
+          <a:bodyPr rtlCol="0" anchor="ctr"/>
+          <a:lstStyle/>
+          <a:p>
+            <a:pPr algn="ctr"/>
+            <a:r>
+              <a:rPr lang="en-US" sz="1400" dirty="0" smtClean="0"/>
+              <a:t>App VM</a:t>
+            </a:r>
+            <a:endParaRPr lang="en-US" sz="1400" dirty="0"/>
+          </a:p>
+        </p:txBody>
+      </p:sp>
+      <p:sp>
+        <p:nvSpPr>
+          <p:cNvPr id="22" name="Rectangle 21"/>
+          <p:cNvSpPr/>
+          <p:nvPr/>
+        </p:nvSpPr>
+        <p:spPr>
+          <a:xfrm>
+            <a:off x="8915401" y="5399806"/>
+            <a:ext cx="761994" cy="347708"/>
+          </a:xfrm>
+          <a:prstGeom prst="rect">
+            <a:avLst/>
+          </a:prstGeom>
+        </p:spPr>
+        <p:style>
+          <a:lnRef idx="1">
+            <a:schemeClr val="accent3"/>
+          </a:lnRef>
+          <a:fillRef idx="2">
+            <a:schemeClr val="accent3"/>
+          </a:fillRef>
+          <a:effectRef idx="1">
+            <a:schemeClr val="accent3"/>
+          </a:effectRef>
+          <a:fontRef idx="minor">
+            <a:schemeClr val="dk1"/>
+          </a:fontRef>
+        </p:style>
+        <p:txBody>
+          <a:bodyPr rtlCol="0" anchor="ctr"/>
+          <a:lstStyle/>
+          <a:p>
+            <a:pPr algn="ctr"/>
+            <a:r>
+              <a:rPr lang="en-US" sz="1400" dirty="0" smtClean="0"/>
+              <a:t>App UI</a:t>
+            </a:r>
+            <a:endParaRPr lang="en-US" sz="1400" dirty="0"/>
+          </a:p>
+        </p:txBody>
+      </p:sp>
+      <p:sp>
+        <p:nvSpPr>
+          <p:cNvPr id="23" name="Rectangle 22"/>
+          <p:cNvSpPr/>
+          <p:nvPr/>
+        </p:nvSpPr>
+        <p:spPr>
+          <a:xfrm>
+            <a:off x="9267259" y="5812425"/>
+            <a:ext cx="810770" cy="320000"/>
+          </a:xfrm>
+          <a:prstGeom prst="rect">
+            <a:avLst/>
+          </a:prstGeom>
+        </p:spPr>
+        <p:style>
+          <a:lnRef idx="1">
+            <a:schemeClr val="accent3"/>
+          </a:lnRef>
+          <a:fillRef idx="2">
+            <a:schemeClr val="accent3"/>
+          </a:fillRef>
+          <a:effectRef idx="1">
+            <a:schemeClr val="accent3"/>
+          </a:effectRef>
+          <a:fontRef idx="minor">
+            <a:schemeClr val="dk1"/>
+          </a:fontRef>
+        </p:style>
+        <p:txBody>
+          <a:bodyPr rtlCol="0" anchor="ctr"/>
+          <a:lstStyle/>
+          <a:p>
+            <a:pPr algn="ctr"/>
+            <a:r>
+              <a:rPr lang="en-US" sz="1400" dirty="0" smtClean="0"/>
+              <a:t>App UI</a:t>
+            </a:r>
+            <a:endParaRPr lang="en-US" sz="1400" dirty="0"/>
+          </a:p>
+        </p:txBody>
+      </p:sp>
+      <p:grpSp>
+        <p:nvGrpSpPr>
+          <p:cNvPr id="33" name="Group 32"/>
+          <p:cNvGrpSpPr/>
+          <p:nvPr/>
+        </p:nvGrpSpPr>
+        <p:grpSpPr>
+          <a:xfrm>
+            <a:off x="4068314" y="2200278"/>
+            <a:ext cx="1266826" cy="1152516"/>
+            <a:chOff x="4319761" y="2962273"/>
+            <a:chExt cx="1266826" cy="1152516"/>
+          </a:xfrm>
+        </p:grpSpPr>
+        <p:sp>
+          <p:nvSpPr>
+            <p:cNvPr id="25" name="Rectangle 24"/>
+            <p:cNvSpPr/>
+            <p:nvPr/>
+          </p:nvSpPr>
+          <p:spPr>
+            <a:xfrm>
+              <a:off x="4319761" y="2962273"/>
+              <a:ext cx="1266825" cy="1152515"/>
+            </a:xfrm>
+            <a:prstGeom prst="rect">
+              <a:avLst/>
+            </a:prstGeom>
+          </p:spPr>
+          <p:style>
+            <a:lnRef idx="2">
+              <a:schemeClr val="dk1"/>
+            </a:lnRef>
+            <a:fillRef idx="1">
+              <a:schemeClr val="lt1"/>
+            </a:fillRef>
+            <a:effectRef idx="0">
+              <a:schemeClr val="dk1"/>
+            </a:effectRef>
+            <a:fontRef idx="minor">
+              <a:schemeClr val="dk1"/>
+            </a:fontRef>
+          </p:style>
+          <p:txBody>
+            <a:bodyPr rtlCol="0" anchor="ctr"/>
+            <a:lstStyle/>
+            <a:p>
+              <a:pPr algn="ctr"/>
+              <a:endParaRPr lang="en-US"/>
+            </a:p>
+          </p:txBody>
+        </p:sp>
+        <p:sp>
+          <p:nvSpPr>
+            <p:cNvPr id="26" name="Rectangle 25"/>
+            <p:cNvSpPr/>
+            <p:nvPr/>
+          </p:nvSpPr>
+          <p:spPr>
+            <a:xfrm>
+              <a:off x="4319762" y="3743314"/>
+              <a:ext cx="1266825" cy="371475"/>
+            </a:xfrm>
+            <a:prstGeom prst="rect">
+              <a:avLst/>
+            </a:prstGeom>
+          </p:spPr>
+          <p:style>
+            <a:lnRef idx="2">
+              <a:schemeClr val="dk1">
+                <a:shade val="50000"/>
+              </a:schemeClr>
+            </a:lnRef>
+            <a:fillRef idx="1">
+              <a:schemeClr val="dk1"/>
+            </a:fillRef>
+            <a:effectRef idx="0">
+              <a:schemeClr val="dk1"/>
+            </a:effectRef>
+            <a:fontRef idx="minor">
+              <a:schemeClr val="lt1"/>
+            </a:fontRef>
+          </p:style>
+          <p:txBody>
+            <a:bodyPr rtlCol="0" anchor="ctr"/>
+            <a:lstStyle/>
+            <a:p>
+              <a:pPr algn="ctr"/>
+              <a:r>
+                <a:rPr lang="en-US" dirty="0" smtClean="0"/>
+                <a:t>Nested HV</a:t>
+              </a:r>
+              <a:endParaRPr lang="en-US" dirty="0"/>
+            </a:p>
+          </p:txBody>
+        </p:sp>
+      </p:grpSp>
+      <p:sp>
+        <p:nvSpPr>
+          <p:cNvPr id="27" name="Rectangle 26"/>
+          <p:cNvSpPr/>
+          <p:nvPr/>
+        </p:nvSpPr>
+        <p:spPr>
+          <a:xfrm>
+            <a:off x="4068314" y="4805360"/>
+            <a:ext cx="1266825" cy="1152515"/>
+          </a:xfrm>
+          <a:prstGeom prst="rect">
+            <a:avLst/>
+          </a:prstGeom>
+        </p:spPr>
+        <p:style>
+          <a:lnRef idx="2">
+            <a:schemeClr val="dk1"/>
+          </a:lnRef>
+          <a:fillRef idx="1">
+            <a:schemeClr val="lt1"/>
+          </a:fillRef>
+          <a:effectRef idx="0">
+            <a:schemeClr val="dk1"/>
+          </a:effectRef>
+          <a:fontRef idx="minor">
+            <a:schemeClr val="dk1"/>
+          </a:fontRef>
+        </p:style>
+        <p:txBody>
+          <a:bodyPr rtlCol="0" anchor="ctr"/>
+          <a:lstStyle/>
+          <a:p>
+            <a:pPr algn="ctr"/>
+            <a:endParaRPr lang="en-US"/>
+          </a:p>
+        </p:txBody>
+      </p:sp>
+      <p:sp>
+        <p:nvSpPr>
+          <p:cNvPr id="28" name="Rectangle 27"/>
+          <p:cNvSpPr/>
+          <p:nvPr/>
+        </p:nvSpPr>
+        <p:spPr>
+          <a:xfrm>
+            <a:off x="4068315" y="5586401"/>
+            <a:ext cx="1266825" cy="371475"/>
+          </a:xfrm>
+          <a:prstGeom prst="rect">
+            <a:avLst/>
+          </a:prstGeom>
+        </p:spPr>
+        <p:style>
+          <a:lnRef idx="2">
+            <a:schemeClr val="dk1">
+              <a:shade val="50000"/>
+            </a:schemeClr>
+          </a:lnRef>
+          <a:fillRef idx="1">
+            <a:schemeClr val="dk1"/>
+          </a:fillRef>
+          <a:effectRef idx="0">
+            <a:schemeClr val="dk1"/>
+          </a:effectRef>
+          <a:fontRef idx="minor">
+            <a:schemeClr val="lt1"/>
+          </a:fontRef>
+        </p:style>
+        <p:txBody>
+          <a:bodyPr rtlCol="0" anchor="ctr"/>
+          <a:lstStyle/>
+          <a:p>
+            <a:pPr algn="ctr"/>
+            <a:r>
+              <a:rPr lang="en-US" dirty="0" smtClean="0"/>
+              <a:t>Nested HV</a:t>
+            </a:r>
+            <a:endParaRPr lang="en-US" dirty="0"/>
+          </a:p>
+        </p:txBody>
+      </p:sp>
+      <p:cxnSp>
+        <p:nvCxnSpPr>
+          <p:cNvPr id="35" name="Elbow Connector 34"/>
+          <p:cNvCxnSpPr>
+            <a:stCxn id="21" idx="3"/>
+            <a:endCxn id="22" idx="0"/>
+          </p:cNvCxnSpPr>
+          <p:nvPr/>
+        </p:nvCxnSpPr>
+        <p:spPr>
+          <a:xfrm>
+            <a:off x="7253780" y="4879174"/>
+            <a:ext cx="2042618" cy="520632"/>
+          </a:xfrm>
+          <a:prstGeom prst="bentConnector2">
+            <a:avLst/>
+          </a:prstGeom>
+          <a:ln w="57150">
+            <a:tailEnd type="oval"/>
+          </a:ln>
+        </p:spPr>
+        <p:style>
+          <a:lnRef idx="3">
+            <a:schemeClr val="dk1"/>
+          </a:lnRef>
+          <a:fillRef idx="0">
+            <a:schemeClr val="dk1"/>
+          </a:fillRef>
+          <a:effectRef idx="2">
+            <a:schemeClr val="dk1"/>
+          </a:effectRef>
+          <a:fontRef idx="minor">
+            <a:schemeClr val="tx1"/>
+          </a:fontRef>
+        </p:style>
+      </p:cxnSp>
+      <p:cxnSp>
+        <p:nvCxnSpPr>
+          <p:cNvPr id="37" name="Elbow Connector 36"/>
+          <p:cNvCxnSpPr>
+            <a:stCxn id="20" idx="3"/>
+            <a:endCxn id="23" idx="0"/>
+          </p:cNvCxnSpPr>
+          <p:nvPr/>
+        </p:nvCxnSpPr>
+        <p:spPr>
+          <a:xfrm>
+            <a:off x="7253781" y="2786058"/>
+            <a:ext cx="2418863" cy="3026367"/>
+          </a:xfrm>
+          <a:prstGeom prst="bentConnector2">
+            <a:avLst/>
+          </a:prstGeom>
+          <a:ln w="57150">
+            <a:tailEnd type="oval"/>
+          </a:ln>
+        </p:spPr>
+        <p:style>
+          <a:lnRef idx="3">
+            <a:schemeClr val="dk1"/>
+          </a:lnRef>
+          <a:fillRef idx="0">
+            <a:schemeClr val="dk1"/>
+          </a:fillRef>
+          <a:effectRef idx="2">
+            <a:schemeClr val="dk1"/>
+          </a:effectRef>
+          <a:fontRef idx="minor">
+            <a:schemeClr val="tx1"/>
+          </a:fontRef>
+        </p:style>
+      </p:cxnSp>
+      <p:grpSp>
+        <p:nvGrpSpPr>
+          <p:cNvPr id="45" name="Group 44"/>
+          <p:cNvGrpSpPr/>
+          <p:nvPr/>
+        </p:nvGrpSpPr>
+        <p:grpSpPr>
+          <a:xfrm>
+            <a:off x="334639" y="5211184"/>
+            <a:ext cx="1476238" cy="1166874"/>
+            <a:chOff x="332274" y="3352793"/>
+            <a:chExt cx="1476238" cy="1166874"/>
+          </a:xfrm>
+        </p:grpSpPr>
+        <p:pic>
+          <p:nvPicPr>
+            <p:cNvPr id="43" name="Content Placeholder 6"/>
+            <p:cNvPicPr>
+              <a:picLocks noChangeAspect="1"/>
+            </p:cNvPicPr>
+            <p:nvPr/>
+          </p:nvPicPr>
+          <p:blipFill>
+            <a:blip r:embed="rId2" cstate="print">
+              <a:grayscl/>
+              <a:extLst>
+                <a:ext uri="{28A0092B-C50C-407E-A947-70E740481C1C}">
+                  <a14:useLocalDpi xmlns:a14="http://schemas.microsoft.com/office/drawing/2010/main" val="0"/>
+                </a:ext>
+              </a:extLst>
+            </a:blip>
+            <a:stretch>
+              <a:fillRect/>
+            </a:stretch>
+          </p:blipFill>
+          <p:spPr>
+            <a:xfrm flipH="1">
+              <a:off x="657222" y="3352793"/>
+              <a:ext cx="826342" cy="797542"/>
+            </a:xfrm>
+            <a:prstGeom prst="rect">
+              <a:avLst/>
+            </a:prstGeom>
+          </p:spPr>
+        </p:pic>
+        <p:sp>
+          <p:nvSpPr>
+            <p:cNvPr id="44" name="TextBox 43"/>
+            <p:cNvSpPr txBox="1"/>
+            <p:nvPr/>
+          </p:nvSpPr>
+          <p:spPr>
+            <a:xfrm>
+              <a:off x="332274" y="4150335"/>
+              <a:ext cx="1476238" cy="369332"/>
+            </a:xfrm>
+            <a:prstGeom prst="rect">
+              <a:avLst/>
+            </a:prstGeom>
+            <a:noFill/>
+          </p:spPr>
+          <p:txBody>
+            <a:bodyPr wrap="none" rtlCol="0">
+              <a:spAutoFit/>
+            </a:bodyPr>
+            <a:lstStyle/>
+            <a:p>
+              <a:pPr algn="ctr"/>
+              <a:r>
+                <a:rPr lang="en-US" dirty="0" smtClean="0"/>
+                <a:t>Administrator</a:t>
+              </a:r>
+              <a:endParaRPr lang="en-US" dirty="0"/>
+            </a:p>
+          </p:txBody>
+        </p:sp>
+      </p:grpSp>
+      <p:sp>
+        <p:nvSpPr>
+          <p:cNvPr id="46" name="Can 45"/>
+          <p:cNvSpPr/>
+          <p:nvPr/>
+        </p:nvSpPr>
+        <p:spPr>
+          <a:xfrm>
+            <a:off x="2322515" y="4191000"/>
+            <a:ext cx="1259361" cy="754851"/>
+          </a:xfrm>
+          <a:prstGeom prst="can">
+            <a:avLst>
+              <a:gd name="adj" fmla="val 14011"/>
+            </a:avLst>
+          </a:prstGeom>
+        </p:spPr>
+        <p:style>
+          <a:lnRef idx="2">
+            <a:schemeClr val="dk1"/>
+          </a:lnRef>
+          <a:fillRef idx="1">
+            <a:schemeClr val="lt1"/>
+          </a:fillRef>
+          <a:effectRef idx="0">
+            <a:schemeClr val="dk1"/>
+          </a:effectRef>
+          <a:fontRef idx="minor">
+            <a:schemeClr val="dk1"/>
+          </a:fontRef>
+        </p:style>
+        <p:txBody>
+          <a:bodyPr rtlCol="0" anchor="ctr"/>
+          <a:lstStyle/>
+          <a:p>
+            <a:pPr algn="ctr"/>
+            <a:r>
+              <a:rPr lang="en-US" dirty="0" smtClean="0"/>
+              <a:t>Centralized Logging</a:t>
+            </a:r>
+            <a:endParaRPr lang="en-US" dirty="0"/>
+          </a:p>
+        </p:txBody>
+      </p:sp>
+      <p:sp>
+        <p:nvSpPr>
+          <p:cNvPr id="47" name="Rectangle 46"/>
+          <p:cNvSpPr/>
+          <p:nvPr/>
+        </p:nvSpPr>
+        <p:spPr>
+          <a:xfrm>
+            <a:off x="2322515" y="3448043"/>
+            <a:ext cx="1259361" cy="633419"/>
+          </a:xfrm>
+          <a:prstGeom prst="rect">
+            <a:avLst/>
+          </a:prstGeom>
+        </p:spPr>
+        <p:style>
+          <a:lnRef idx="2">
+            <a:schemeClr val="dk1"/>
+          </a:lnRef>
+          <a:fillRef idx="1">
+            <a:schemeClr val="lt1"/>
+          </a:fillRef>
+          <a:effectRef idx="0">
+            <a:schemeClr val="dk1"/>
+          </a:effectRef>
+          <a:fontRef idx="minor">
+            <a:schemeClr val="dk1"/>
+          </a:fontRef>
+        </p:style>
+        <p:txBody>
+          <a:bodyPr rtlCol="0" anchor="ctr"/>
+          <a:lstStyle/>
+          <a:p>
+            <a:pPr algn="ctr"/>
+            <a:r>
+              <a:rPr lang="en-US" dirty="0" smtClean="0"/>
+              <a:t>Admin Interface</a:t>
+            </a:r>
+            <a:endParaRPr lang="en-US" dirty="0"/>
+          </a:p>
+        </p:txBody>
+      </p:sp>
+      <p:cxnSp>
+        <p:nvCxnSpPr>
+          <p:cNvPr id="48" name="Elbow Connector 47"/>
+          <p:cNvCxnSpPr>
+            <a:endCxn id="47" idx="1"/>
+          </p:cNvCxnSpPr>
+          <p:nvPr/>
+        </p:nvCxnSpPr>
+        <p:spPr>
+          <a:xfrm rot="5400000" flipH="1" flipV="1">
+            <a:off x="1025255" y="3820041"/>
+            <a:ext cx="1352548" cy="1241972"/>
+          </a:xfrm>
+          <a:prstGeom prst="bentConnector2">
+            <a:avLst/>
+          </a:prstGeom>
+          <a:ln w="57150">
+            <a:tailEnd type="oval"/>
+          </a:ln>
+        </p:spPr>
+        <p:style>
+          <a:lnRef idx="3">
+            <a:schemeClr val="dk1"/>
+          </a:lnRef>
+          <a:fillRef idx="0">
+            <a:schemeClr val="dk1"/>
+          </a:fillRef>
+          <a:effectRef idx="2">
+            <a:schemeClr val="dk1"/>
+          </a:effectRef>
+          <a:fontRef idx="minor">
+            <a:schemeClr val="tx1"/>
+          </a:fontRef>
+        </p:style>
+      </p:cxnSp>
+      <p:cxnSp>
+        <p:nvCxnSpPr>
+          <p:cNvPr id="56" name="Straight Arrow Connector 55"/>
+          <p:cNvCxnSpPr>
+            <a:endCxn id="46" idx="2"/>
+          </p:cNvCxnSpPr>
+          <p:nvPr/>
+        </p:nvCxnSpPr>
+        <p:spPr>
+          <a:xfrm>
+            <a:off x="1080543" y="4568426"/>
+            <a:ext cx="1241972" cy="0"/>
+          </a:xfrm>
+          <a:prstGeom prst="straightConnector1">
+            <a:avLst/>
+          </a:prstGeom>
+          <a:ln w="57150">
+            <a:tailEnd type="oval"/>
+          </a:ln>
+        </p:spPr>
+        <p:style>
+          <a:lnRef idx="3">
+            <a:schemeClr val="dk1"/>
+          </a:lnRef>
+          <a:fillRef idx="0">
+            <a:schemeClr val="dk1"/>
+          </a:fillRef>
+          <a:effectRef idx="2">
+            <a:schemeClr val="dk1"/>
+          </a:effectRef>
+          <a:fontRef idx="minor">
+            <a:schemeClr val="tx1"/>
+          </a:fontRef>
+        </p:style>
+      </p:cxnSp>
+      <p:cxnSp>
+        <p:nvCxnSpPr>
+          <p:cNvPr id="61" name="Elbow Connector 60"/>
+          <p:cNvCxnSpPr>
+            <a:stCxn id="47" idx="3"/>
+            <a:endCxn id="26" idx="2"/>
+          </p:cNvCxnSpPr>
+          <p:nvPr/>
+        </p:nvCxnSpPr>
+        <p:spPr>
+          <a:xfrm flipV="1">
+            <a:off x="3581876" y="3352794"/>
+            <a:ext cx="1119852" cy="411959"/>
+          </a:xfrm>
+          <a:prstGeom prst="bentConnector2">
+            <a:avLst/>
+          </a:prstGeom>
+          <a:ln w="15875" cap="flat" cmpd="sng" algn="ctr">
+            <a:solidFill>
+              <a:schemeClr val="dk1"/>
+            </a:solidFill>
+            <a:prstDash val="dash"/>
+            <a:round/>
+            <a:headEnd type="none" w="med" len="med"/>
+            <a:tailEnd type="none" w="med" len="med"/>
+          </a:ln>
+        </p:spPr>
+        <p:style>
+          <a:lnRef idx="0">
+            <a:scrgbClr r="0" g="0" b="0"/>
+          </a:lnRef>
+          <a:fillRef idx="0">
+            <a:scrgbClr r="0" g="0" b="0"/>
+          </a:fillRef>
+          <a:effectRef idx="0">
+            <a:scrgbClr r="0" g="0" b="0"/>
+          </a:effectRef>
+          <a:fontRef idx="minor">
+            <a:schemeClr val="tx1"/>
+          </a:fontRef>
+        </p:style>
+      </p:cxnSp>
+      <p:cxnSp>
+        <p:nvCxnSpPr>
+          <p:cNvPr id="62" name="Elbow Connector 61"/>
+          <p:cNvCxnSpPr>
+            <a:stCxn id="47" idx="3"/>
+            <a:endCxn id="14" idx="2"/>
+          </p:cNvCxnSpPr>
+          <p:nvPr/>
+        </p:nvCxnSpPr>
+        <p:spPr>
+          <a:xfrm flipV="1">
+            <a:off x="3581876" y="3538532"/>
+            <a:ext cx="3147535" cy="226221"/>
+          </a:xfrm>
+          <a:prstGeom prst="bentConnector2">
+            <a:avLst/>
+          </a:prstGeom>
+          <a:ln w="15875" cap="flat" cmpd="sng" algn="ctr">
+            <a:solidFill>
+              <a:schemeClr val="dk1"/>
+            </a:solidFill>
+            <a:prstDash val="dash"/>
+            <a:round/>
+            <a:headEnd type="none" w="med" len="med"/>
+            <a:tailEnd type="none" w="med" len="med"/>
+          </a:ln>
+        </p:spPr>
+        <p:style>
+          <a:lnRef idx="0">
+            <a:scrgbClr r="0" g="0" b="0"/>
+          </a:lnRef>
+          <a:fillRef idx="0">
+            <a:scrgbClr r="0" g="0" b="0"/>
+          </a:fillRef>
+          <a:effectRef idx="0">
+            <a:scrgbClr r="0" g="0" b="0"/>
+          </a:effectRef>
+          <a:fontRef idx="minor">
+            <a:schemeClr val="tx1"/>
+          </a:fontRef>
+        </p:style>
+      </p:cxnSp>
+      <p:cxnSp>
+        <p:nvCxnSpPr>
+          <p:cNvPr id="65" name="Elbow Connector 64"/>
+          <p:cNvCxnSpPr>
+            <a:stCxn id="47" idx="3"/>
+            <a:endCxn id="27" idx="0"/>
+          </p:cNvCxnSpPr>
+          <p:nvPr/>
+        </p:nvCxnSpPr>
+        <p:spPr>
+          <a:xfrm>
+            <a:off x="3581876" y="3764753"/>
+            <a:ext cx="1119851" cy="1040607"/>
+          </a:xfrm>
+          <a:prstGeom prst="bentConnector2">
+            <a:avLst/>
+          </a:prstGeom>
+          <a:ln w="15875" cap="flat" cmpd="sng" algn="ctr">
+            <a:solidFill>
+              <a:schemeClr val="dk1"/>
+            </a:solidFill>
+            <a:prstDash val="dash"/>
+            <a:round/>
+            <a:headEnd type="none" w="med" len="med"/>
+            <a:tailEnd type="none" w="med" len="med"/>
+          </a:ln>
+        </p:spPr>
+        <p:style>
+          <a:lnRef idx="0">
+            <a:scrgbClr r="0" g="0" b="0"/>
+          </a:lnRef>
+          <a:fillRef idx="0">
+            <a:scrgbClr r="0" g="0" b="0"/>
+          </a:fillRef>
+          <a:effectRef idx="0">
+            <a:scrgbClr r="0" g="0" b="0"/>
+          </a:effectRef>
+          <a:fontRef idx="minor">
+            <a:schemeClr val="tx1"/>
+          </a:fontRef>
+        </p:style>
+      </p:cxnSp>
+      <p:cxnSp>
+        <p:nvCxnSpPr>
+          <p:cNvPr id="68" name="Elbow Connector 67"/>
+          <p:cNvCxnSpPr>
+            <a:stCxn id="47" idx="3"/>
+            <a:endCxn id="17" idx="0"/>
+          </p:cNvCxnSpPr>
+          <p:nvPr/>
+        </p:nvCxnSpPr>
+        <p:spPr>
+          <a:xfrm>
+            <a:off x="3581876" y="3764753"/>
+            <a:ext cx="3147534" cy="711996"/>
+          </a:xfrm>
+          <a:prstGeom prst="bentConnector2">
+            <a:avLst/>
+          </a:prstGeom>
+          <a:ln w="15875" cap="flat" cmpd="sng" algn="ctr">
+            <a:solidFill>
+              <a:schemeClr val="dk1"/>
+            </a:solidFill>
+            <a:prstDash val="dash"/>
+            <a:round/>
+            <a:headEnd type="none" w="med" len="med"/>
+            <a:tailEnd type="none" w="med" len="med"/>
+          </a:ln>
+        </p:spPr>
+        <p:style>
+          <a:lnRef idx="0">
+            <a:scrgbClr r="0" g="0" b="0"/>
+          </a:lnRef>
+          <a:fillRef idx="0">
+            <a:scrgbClr r="0" g="0" b="0"/>
+          </a:fillRef>
+          <a:effectRef idx="0">
+            <a:scrgbClr r="0" g="0" b="0"/>
+          </a:effectRef>
+          <a:fontRef idx="minor">
+            <a:schemeClr val="tx1"/>
+          </a:fontRef>
+        </p:style>
+      </p:cxnSp>
+      <p:cxnSp>
+        <p:nvCxnSpPr>
+          <p:cNvPr id="81" name="Straight Connector 80"/>
+          <p:cNvCxnSpPr>
+            <a:stCxn id="46" idx="4"/>
+          </p:cNvCxnSpPr>
+          <p:nvPr/>
+        </p:nvCxnSpPr>
+        <p:spPr>
+          <a:xfrm flipV="1">
+            <a:off x="3581876" y="4568425"/>
+            <a:ext cx="1119850" cy="1"/>
+          </a:xfrm>
+          <a:prstGeom prst="line">
+            <a:avLst/>
+          </a:prstGeom>
+          <a:ln w="15875" cap="flat" cmpd="sng" algn="ctr">
+            <a:solidFill>
+              <a:schemeClr val="dk1"/>
+            </a:solidFill>
+            <a:prstDash val="dash"/>
+            <a:round/>
+            <a:headEnd type="none" w="med" len="med"/>
+            <a:tailEnd type="none" w="med" len="med"/>
+          </a:ln>
+        </p:spPr>
+        <p:style>
+          <a:lnRef idx="0">
+            <a:scrgbClr r="0" g="0" b="0"/>
+          </a:lnRef>
+          <a:fillRef idx="0">
+            <a:scrgbClr r="0" g="0" b="0"/>
+          </a:fillRef>
+          <a:effectRef idx="0">
+            <a:scrgbClr r="0" g="0" b="0"/>
+          </a:effectRef>
+          <a:fontRef idx="minor">
+            <a:schemeClr val="tx1"/>
+          </a:fontRef>
+        </p:style>
+      </p:cxnSp>
+      <p:sp>
+        <p:nvSpPr>
+          <p:cNvPr id="82" name="Rectangle 81"/>
+          <p:cNvSpPr/>
+          <p:nvPr/>
+        </p:nvSpPr>
+        <p:spPr>
+          <a:xfrm>
+            <a:off x="4756666" y="2299539"/>
+            <a:ext cx="476251" cy="581025"/>
+          </a:xfrm>
+          <a:prstGeom prst="rect">
+            <a:avLst/>
+          </a:prstGeom>
+          <a:gradFill flip="none" rotWithShape="1">
+            <a:gsLst>
+              <a:gs pos="25000">
+                <a:schemeClr val="accent3"/>
+              </a:gs>
+              <a:gs pos="100000">
+                <a:schemeClr val="bg1"/>
+              </a:gs>
+            </a:gsLst>
+            <a:lin ang="5400000" scaled="1"/>
+            <a:tileRect/>
+          </a:gradFill>
+          <a:ln>
+            <a:prstDash val="dash"/>
+          </a:ln>
+        </p:spPr>
+        <p:style>
+          <a:lnRef idx="1">
+            <a:schemeClr val="accent3"/>
+          </a:lnRef>
+          <a:fillRef idx="2">
+            <a:schemeClr val="accent3"/>
+          </a:fillRef>
+          <a:effectRef idx="1">
+            <a:schemeClr val="accent3"/>
+          </a:effectRef>
+          <a:fontRef idx="minor">
+            <a:schemeClr val="dk1"/>
+          </a:fontRef>
+        </p:style>
+        <p:txBody>
+          <a:bodyPr rtlCol="0" anchor="ctr"/>
+          <a:lstStyle/>
+          <a:p>
+            <a:pPr algn="ctr"/>
+            <a:r>
+              <a:rPr lang="en-US" sz="1400" dirty="0" smtClean="0"/>
+              <a:t>App VM</a:t>
+            </a:r>
+            <a:endParaRPr lang="en-US" sz="1400" dirty="0"/>
+          </a:p>
+        </p:txBody>
+      </p:sp>
+      <p:cxnSp>
+        <p:nvCxnSpPr>
+          <p:cNvPr id="86" name="Elbow Connector 85"/>
+          <p:cNvCxnSpPr>
+            <a:stCxn id="19" idx="0"/>
+            <a:endCxn id="82" idx="0"/>
+          </p:cNvCxnSpPr>
+          <p:nvPr/>
+        </p:nvCxnSpPr>
+        <p:spPr>
+          <a:xfrm rot="16200000" flipV="1">
+            <a:off x="5614575" y="1679756"/>
+            <a:ext cx="196006" cy="1435572"/>
+          </a:xfrm>
+          <a:prstGeom prst="bentConnector3">
+            <a:avLst>
+              <a:gd name="adj1" fmla="val 235478"/>
+            </a:avLst>
+          </a:prstGeom>
+          <a:ln w="15875" cap="flat" cmpd="sng" algn="ctr">
+            <a:solidFill>
+              <a:schemeClr val="dk1"/>
+            </a:solidFill>
+            <a:prstDash val="dash"/>
+            <a:round/>
+            <a:headEnd type="none" w="med" len="med"/>
+            <a:tailEnd type="stealth" w="med" len="med"/>
+          </a:ln>
+        </p:spPr>
+        <p:style>
+          <a:lnRef idx="0">
+            <a:scrgbClr r="0" g="0" b="0"/>
+          </a:lnRef>
+          <a:fillRef idx="0">
+            <a:scrgbClr r="0" g="0" b="0"/>
+          </a:fillRef>
+          <a:effectRef idx="0">
+            <a:scrgbClr r="0" g="0" b="0"/>
+          </a:effectRef>
+          <a:fontRef idx="minor">
+            <a:schemeClr val="tx1"/>
+          </a:fontRef>
+        </p:style>
+      </p:cxnSp>
+      <p:sp>
+        <p:nvSpPr>
+          <p:cNvPr id="91" name="Rectangle 90"/>
+          <p:cNvSpPr/>
+          <p:nvPr/>
+        </p:nvSpPr>
+        <p:spPr>
+          <a:xfrm>
+            <a:off x="9706638" y="5343266"/>
+            <a:ext cx="681532" cy="325067"/>
+          </a:xfrm>
+          <a:prstGeom prst="rect">
+            <a:avLst/>
+          </a:prstGeom>
+        </p:spPr>
+        <p:style>
+          <a:lnRef idx="1">
+            <a:schemeClr val="accent3"/>
+          </a:lnRef>
+          <a:fillRef idx="2">
+            <a:schemeClr val="accent3"/>
+          </a:fillRef>
+          <a:effectRef idx="1">
+            <a:schemeClr val="accent3"/>
+          </a:effectRef>
+          <a:fontRef idx="minor">
+            <a:schemeClr val="dk1"/>
+          </a:fontRef>
+        </p:style>
+        <p:txBody>
+          <a:bodyPr rtlCol="0" anchor="ctr"/>
+          <a:lstStyle/>
+          <a:p>
+            <a:pPr algn="ctr"/>
+            <a:r>
+              <a:rPr lang="en-US" sz="1400" dirty="0" smtClean="0"/>
+              <a:t>App UI</a:t>
+            </a:r>
+            <a:endParaRPr lang="en-US" sz="1400" dirty="0"/>
+          </a:p>
+        </p:txBody>
+      </p:sp>
+      <p:cxnSp>
+        <p:nvCxnSpPr>
+          <p:cNvPr id="93" name="Elbow Connector 92"/>
+          <p:cNvCxnSpPr>
+            <a:stCxn id="82" idx="3"/>
+            <a:endCxn id="91" idx="0"/>
+          </p:cNvCxnSpPr>
+          <p:nvPr/>
+        </p:nvCxnSpPr>
+        <p:spPr>
+          <a:xfrm>
+            <a:off x="5232917" y="2590052"/>
+            <a:ext cx="4814487" cy="2753214"/>
+          </a:xfrm>
+          <a:prstGeom prst="bentConnector2">
+            <a:avLst/>
+          </a:prstGeom>
+          <a:ln w="57150">
+            <a:tailEnd type="oval"/>
+          </a:ln>
+        </p:spPr>
+        <p:style>
+          <a:lnRef idx="3">
+            <a:schemeClr val="dk1"/>
+          </a:lnRef>
+          <a:fillRef idx="0">
+            <a:schemeClr val="dk1"/>
+          </a:fillRef>
+          <a:effectRef idx="2">
+            <a:schemeClr val="dk1"/>
+          </a:effectRef>
+          <a:fontRef idx="minor">
+            <a:schemeClr val="tx1"/>
+          </a:fontRef>
+        </p:style>
+      </p:cxnSp>
+      <p:sp>
+        <p:nvSpPr>
+          <p:cNvPr id="16" name="Rectangle 15"/>
+          <p:cNvSpPr/>
+          <p:nvPr/>
+        </p:nvSpPr>
+        <p:spPr>
+          <a:xfrm>
+            <a:off x="6095997" y="2390774"/>
+            <a:ext cx="1266825" cy="1147757"/>
+          </a:xfrm>
+          <a:prstGeom prst="rect">
+            <a:avLst/>
+          </a:prstGeom>
+        </p:spPr>
+        <p:style>
+          <a:lnRef idx="2">
+            <a:schemeClr val="dk1"/>
+          </a:lnRef>
+          <a:fillRef idx="1">
+            <a:schemeClr val="lt1"/>
+          </a:fillRef>
+          <a:effectRef idx="0">
+            <a:schemeClr val="dk1"/>
+          </a:effectRef>
+          <a:fontRef idx="minor">
+            <a:schemeClr val="dk1"/>
+          </a:fontRef>
+        </p:style>
+        <p:txBody>
+          <a:bodyPr rtlCol="0" anchor="ctr"/>
+          <a:lstStyle/>
+          <a:p>
+            <a:pPr algn="ctr"/>
+            <a:endParaRPr lang="en-US"/>
+          </a:p>
+        </p:txBody>
+      </p:sp>
+      <p:sp>
+        <p:nvSpPr>
+          <p:cNvPr id="14" name="Rectangle 13"/>
+          <p:cNvSpPr/>
+          <p:nvPr/>
+        </p:nvSpPr>
+        <p:spPr>
+          <a:xfrm>
+            <a:off x="6095998" y="3167057"/>
+            <a:ext cx="1266825" cy="371475"/>
+          </a:xfrm>
+          <a:prstGeom prst="rect">
+            <a:avLst/>
+          </a:prstGeom>
+        </p:spPr>
+        <p:style>
+          <a:lnRef idx="2">
+            <a:schemeClr val="dk1">
+              <a:shade val="50000"/>
+            </a:schemeClr>
+          </a:lnRef>
+          <a:fillRef idx="1">
+            <a:schemeClr val="dk1"/>
+          </a:fillRef>
+          <a:effectRef idx="0">
+            <a:schemeClr val="dk1"/>
+          </a:effectRef>
+          <a:fontRef idx="minor">
+            <a:schemeClr val="lt1"/>
+          </a:fontRef>
+        </p:style>
+        <p:txBody>
+          <a:bodyPr rtlCol="0" anchor="ctr"/>
+          <a:lstStyle/>
+          <a:p>
+            <a:pPr algn="ctr"/>
+            <a:r>
+              <a:rPr lang="en-US" dirty="0" smtClean="0"/>
+              <a:t>Nested HV</a:t>
+            </a:r>
+            <a:endParaRPr lang="en-US" dirty="0"/>
+          </a:p>
+        </p:txBody>
+      </p:sp>
+      <p:sp>
+        <p:nvSpPr>
+          <p:cNvPr id="19" name="Rectangle 18"/>
+          <p:cNvSpPr/>
+          <p:nvPr/>
+        </p:nvSpPr>
+        <p:spPr>
+          <a:xfrm>
+            <a:off x="6192238" y="2495545"/>
+            <a:ext cx="476251" cy="581025"/>
+          </a:xfrm>
+          <a:prstGeom prst="rect">
+            <a:avLst/>
+          </a:prstGeom>
+          <a:gradFill flip="none" rotWithShape="1">
+            <a:gsLst>
+              <a:gs pos="25000">
+                <a:schemeClr val="bg1"/>
+              </a:gs>
+              <a:gs pos="100000">
+                <a:schemeClr val="accent3"/>
+              </a:gs>
+            </a:gsLst>
+            <a:lin ang="5400000" scaled="1"/>
+            <a:tileRect/>
+          </a:gradFill>
+          <a:ln>
+            <a:prstDash val="dash"/>
+          </a:ln>
+        </p:spPr>
+        <p:style>
+          <a:lnRef idx="1">
+            <a:schemeClr val="accent3"/>
+          </a:lnRef>
+          <a:fillRef idx="2">
+            <a:schemeClr val="accent3"/>
+          </a:fillRef>
+          <a:effectRef idx="1">
+            <a:schemeClr val="accent3"/>
+          </a:effectRef>
+          <a:fontRef idx="minor">
+            <a:schemeClr val="dk1"/>
+          </a:fontRef>
+        </p:style>
+        <p:txBody>
+          <a:bodyPr rtlCol="0" anchor="ctr"/>
+          <a:lstStyle/>
+          <a:p>
+            <a:pPr algn="ctr"/>
+            <a:r>
+              <a:rPr lang="en-US" sz="1400" dirty="0" smtClean="0"/>
+              <a:t>App VM</a:t>
+            </a:r>
+            <a:endParaRPr lang="en-US" sz="1400" dirty="0"/>
+          </a:p>
+        </p:txBody>
+      </p:sp>
+      <p:sp>
+        <p:nvSpPr>
+          <p:cNvPr id="20" name="Rectangle 19"/>
+          <p:cNvSpPr/>
+          <p:nvPr/>
+        </p:nvSpPr>
+        <p:spPr>
+          <a:xfrm>
+            <a:off x="6777530" y="2495545"/>
+            <a:ext cx="476251" cy="581025"/>
+          </a:xfrm>
+          <a:prstGeom prst="rect">
+            <a:avLst/>
+          </a:prstGeom>
+        </p:spPr>
+        <p:style>
+          <a:lnRef idx="1">
+            <a:schemeClr val="accent3"/>
+          </a:lnRef>
+          <a:fillRef idx="2">
+            <a:schemeClr val="accent3"/>
+          </a:fillRef>
+          <a:effectRef idx="1">
+            <a:schemeClr val="accent3"/>
+          </a:effectRef>
+          <a:fontRef idx="minor">
+            <a:schemeClr val="dk1"/>
+          </a:fontRef>
+        </p:style>
+        <p:txBody>
+          <a:bodyPr rtlCol="0" anchor="ctr"/>
+          <a:lstStyle/>
+          <a:p>
+            <a:pPr algn="ctr"/>
+            <a:r>
+              <a:rPr lang="en-US" sz="1400" dirty="0" smtClean="0"/>
+              <a:t>App VM</a:t>
+            </a:r>
+            <a:endParaRPr lang="en-US" sz="1400" dirty="0"/>
+          </a:p>
+        </p:txBody>
+      </p:sp>
+    </p:spTree>
+    <p:extLst>
+      <p:ext uri="{BB962C8B-B14F-4D97-AF65-F5344CB8AC3E}">
+        <p14:creationId xmlns:p14="http://schemas.microsoft.com/office/powerpoint/2010/main" val="939641634"/>
+      </p:ext>
+    </p:extLst>
+  </p:cSld>
+  <p:clrMapOvr>
+    <a:masterClrMapping/>
+  </p:clrMapOvr>
+</p:sld>
+</file>
+
+<file path=ppt/slides/slide5.xml><?xml version="1.0" encoding="utf-8"?>
+<p:sld xmlns:a="http://schemas.openxmlformats.org/drawingml/2006/main" xmlns:r="http://schemas.openxmlformats.org/officeDocument/2006/relationships" xmlns:p="http://schemas.openxmlformats.org/presentationml/2006/main">
+  <p:cSld>
+    <p:spTree>
+      <p:nvGrpSpPr>
+        <p:cNvPr id="1" name=""/>
+        <p:cNvGrpSpPr/>
+        <p:nvPr/>
+      </p:nvGrpSpPr>
+      <p:grpSpPr>
+        <a:xfrm>
+          <a:off x="0" y="0"/>
+          <a:ext cx="0" cy="0"/>
+          <a:chOff x="0" y="0"/>
+          <a:chExt cx="0" cy="0"/>
+        </a:xfrm>
+      </p:grpSpPr>
+      <p:sp>
+        <p:nvSpPr>
+          <p:cNvPr id="2" name="Title 1"/>
+          <p:cNvSpPr>
+            <a:spLocks noGrp="1"/>
+          </p:cNvSpPr>
+          <p:nvPr>
+            <p:ph type="title"/>
+          </p:nvPr>
+        </p:nvSpPr>
+        <p:spPr/>
+        <p:txBody>
+          <a:bodyPr/>
+          <a:lstStyle/>
+          <a:p>
+            <a:r>
+              <a:rPr lang="en-US" dirty="0" smtClean="0"/>
               <a:t>Windows Compatibility Layer and Sensing</a:t>
             </a:r>
             <a:endParaRPr lang="en-US" dirty="0"/>
@@ -19337,260 +21692,6 @@
 </p:sld>
 </file>
 
-<file path=ppt/slides/slide5.xml><?xml version="1.0" encoding="utf-8"?>
-<p:sld xmlns:a="http://schemas.openxmlformats.org/drawingml/2006/main" xmlns:r="http://schemas.openxmlformats.org/officeDocument/2006/relationships" xmlns:p="http://schemas.openxmlformats.org/presentationml/2006/main">
-  <p:cSld>
-    <p:spTree>
-      <p:nvGrpSpPr>
-        <p:cNvPr id="1" name=""/>
-        <p:cNvGrpSpPr/>
-        <p:nvPr/>
-      </p:nvGrpSpPr>
-      <p:grpSpPr>
-        <a:xfrm>
-          <a:off x="0" y="0"/>
-          <a:ext cx="0" cy="0"/>
-          <a:chOff x="0" y="0"/>
-          <a:chExt cx="0" cy="0"/>
-        </a:xfrm>
-      </p:grpSpPr>
-      <p:sp>
-        <p:nvSpPr>
-          <p:cNvPr id="2" name="Title 1"/>
-          <p:cNvSpPr>
-            <a:spLocks noGrp="1"/>
-          </p:cNvSpPr>
-          <p:nvPr>
-            <p:ph type="title"/>
-          </p:nvPr>
-        </p:nvSpPr>
-        <p:spPr/>
-        <p:txBody>
-          <a:bodyPr/>
-          <a:lstStyle/>
-          <a:p>
-            <a:r>
-              <a:rPr lang="en-US" dirty="0" smtClean="0"/>
-              <a:t>Secure Kernel</a:t>
-            </a:r>
-            <a:endParaRPr lang="en-US" dirty="0"/>
-          </a:p>
-        </p:txBody>
-      </p:sp>
-      <p:sp>
-        <p:nvSpPr>
-          <p:cNvPr id="3" name="Content Placeholder 2"/>
-          <p:cNvSpPr>
-            <a:spLocks noGrp="1"/>
-          </p:cNvSpPr>
-          <p:nvPr>
-            <p:ph idx="1"/>
-          </p:nvPr>
-        </p:nvSpPr>
-        <p:spPr/>
-        <p:txBody>
-          <a:bodyPr/>
-          <a:lstStyle/>
-          <a:p>
-            <a:r>
-              <a:rPr lang="en-US" dirty="0" smtClean="0"/>
-              <a:t>Apply a set of security-related configuration options</a:t>
-            </a:r>
-          </a:p>
-          <a:p>
-            <a:pPr lvl="1"/>
-            <a:r>
-              <a:rPr lang="en-US" sz="2000" dirty="0" smtClean="0">
-                <a:hlinkClick r:id="rId2"/>
-              </a:rPr>
-              <a:t>https://kernsec.org/wiki/index.php/Kernel_Self_Protection_Project/Recommended_Settings</a:t>
-            </a:r>
-            <a:endParaRPr lang="en-US" sz="2000" dirty="0" smtClean="0"/>
-          </a:p>
-          <a:p>
-            <a:r>
-              <a:rPr lang="en-US" dirty="0" smtClean="0"/>
-              <a:t>Examples:</a:t>
-            </a:r>
-          </a:p>
-          <a:p>
-            <a:pPr lvl="1"/>
-            <a:r>
-              <a:rPr lang="en-US" sz="1800" dirty="0" smtClean="0">
-                <a:latin typeface="Hack" panose="020B0609030202020204" pitchFamily="49" charset="0"/>
-                <a:ea typeface="Hack" panose="020B0609030202020204" pitchFamily="49" charset="0"/>
-                <a:cs typeface="Hack" panose="020B0609030202020204" pitchFamily="49" charset="0"/>
-              </a:rPr>
-              <a:t>CONFIG_DEBUG_WX=y       # report memory pages marked write + exec</a:t>
-            </a:r>
-          </a:p>
-          <a:p>
-            <a:pPr lvl="1"/>
-            <a:r>
-              <a:rPr lang="en-US" sz="1800" dirty="0" smtClean="0">
-                <a:latin typeface="Hack" panose="020B0609030202020204" pitchFamily="49" charset="0"/>
-                <a:ea typeface="Hack" panose="020B0609030202020204" pitchFamily="49" charset="0"/>
-                <a:cs typeface="Hack" panose="020B0609030202020204" pitchFamily="49" charset="0"/>
-              </a:rPr>
-              <a:t>CONFIG_PROC_KCORE=n     # disable virtual kernel core dumps</a:t>
-            </a:r>
-          </a:p>
-          <a:p>
-            <a:pPr lvl="1"/>
-            <a:r>
-              <a:rPr lang="en-US" sz="1800" dirty="0" smtClean="0">
-                <a:latin typeface="Hack" panose="020B0609030202020204" pitchFamily="49" charset="0"/>
-                <a:ea typeface="Hack" panose="020B0609030202020204" pitchFamily="49" charset="0"/>
-                <a:cs typeface="Hack" panose="020B0609030202020204" pitchFamily="49" charset="0"/>
-              </a:rPr>
-              <a:t>CONFIG_STRICT_DEVMEM=y  # enforce strict access to /dev/mem</a:t>
-            </a:r>
-          </a:p>
-          <a:p>
-            <a:pPr lvl="1"/>
-            <a:r>
-              <a:rPr lang="en-US" sz="1800" dirty="0" smtClean="0">
-                <a:latin typeface="Hack" panose="020B0609030202020204" pitchFamily="49" charset="0"/>
-                <a:ea typeface="Hack" panose="020B0609030202020204" pitchFamily="49" charset="0"/>
-                <a:cs typeface="Hack" panose="020B0609030202020204" pitchFamily="49" charset="0"/>
-              </a:rPr>
-              <a:t>CONFIG_KGDB=n           # disable kernel debugger</a:t>
-            </a:r>
-          </a:p>
-          <a:p>
-            <a:pPr lvl="1"/>
-            <a:r>
-              <a:rPr lang="en-US" sz="1800" dirty="0" smtClean="0">
-                <a:latin typeface="Hack" panose="020B0609030202020204" pitchFamily="49" charset="0"/>
-                <a:ea typeface="Hack" panose="020B0609030202020204" pitchFamily="49" charset="0"/>
-                <a:cs typeface="Hack" panose="020B0609030202020204" pitchFamily="49" charset="0"/>
-              </a:rPr>
-              <a:t>CONFIG_HIBERNATION=n    # disable hibernation</a:t>
-            </a:r>
-          </a:p>
-          <a:p>
-            <a:pPr lvl="1"/>
-            <a:r>
-              <a:rPr lang="en-US" sz="1800" dirty="0" smtClean="0">
-                <a:latin typeface="Hack" panose="020B0609030202020204" pitchFamily="49" charset="0"/>
-                <a:ea typeface="Hack" panose="020B0609030202020204" pitchFamily="49" charset="0"/>
-                <a:cs typeface="Hack" panose="020B0609030202020204" pitchFamily="49" charset="0"/>
-              </a:rPr>
-              <a:t>CONFIG_BPF_JIT=n</a:t>
-            </a:r>
-            <a:r>
-              <a:rPr lang="en-US" sz="1800" dirty="0">
-                <a:latin typeface="Hack" panose="020B0609030202020204" pitchFamily="49" charset="0"/>
-                <a:ea typeface="Hack" panose="020B0609030202020204" pitchFamily="49" charset="0"/>
-                <a:cs typeface="Hack" panose="020B0609030202020204" pitchFamily="49" charset="0"/>
-              </a:rPr>
-              <a:t> </a:t>
-            </a:r>
-            <a:r>
-              <a:rPr lang="en-US" sz="1800" dirty="0" smtClean="0">
-                <a:latin typeface="Hack" panose="020B0609030202020204" pitchFamily="49" charset="0"/>
-                <a:ea typeface="Hack" panose="020B0609030202020204" pitchFamily="49" charset="0"/>
-                <a:cs typeface="Hack" panose="020B0609030202020204" pitchFamily="49" charset="0"/>
-              </a:rPr>
-              <a:t>       # disable BPF JIT, used in </a:t>
-            </a:r>
-            <a:r>
-              <a:rPr lang="en-US" sz="1800" dirty="0" err="1" smtClean="0">
-                <a:latin typeface="Hack" panose="020B0609030202020204" pitchFamily="49" charset="0"/>
-                <a:ea typeface="Hack" panose="020B0609030202020204" pitchFamily="49" charset="0"/>
-                <a:cs typeface="Hack" panose="020B0609030202020204" pitchFamily="49" charset="0"/>
-              </a:rPr>
-              <a:t>Spectre</a:t>
-            </a:r>
-            <a:r>
-              <a:rPr lang="en-US" sz="1800" dirty="0" smtClean="0">
-                <a:latin typeface="Hack" panose="020B0609030202020204" pitchFamily="49" charset="0"/>
-                <a:ea typeface="Hack" panose="020B0609030202020204" pitchFamily="49" charset="0"/>
-                <a:cs typeface="Hack" panose="020B0609030202020204" pitchFamily="49" charset="0"/>
-              </a:rPr>
-              <a:t> attacks</a:t>
-            </a:r>
-            <a:endParaRPr lang="en-US" sz="1800" dirty="0">
-              <a:latin typeface="Hack" panose="020B0609030202020204" pitchFamily="49" charset="0"/>
-              <a:ea typeface="Hack" panose="020B0609030202020204" pitchFamily="49" charset="0"/>
-              <a:cs typeface="Hack" panose="020B0609030202020204" pitchFamily="49" charset="0"/>
-            </a:endParaRPr>
-          </a:p>
-          <a:p>
-            <a:r>
-              <a:rPr lang="en-US" dirty="0" smtClean="0"/>
-              <a:t>Future:</a:t>
-            </a:r>
-          </a:p>
-          <a:p>
-            <a:endParaRPr lang="en-US" sz="2200" dirty="0" smtClean="0">
-              <a:latin typeface="Hack" panose="020B0609030202020204" pitchFamily="49" charset="0"/>
-              <a:ea typeface="Hack" panose="020B0609030202020204" pitchFamily="49" charset="0"/>
-              <a:cs typeface="Hack" panose="020B0609030202020204" pitchFamily="49" charset="0"/>
-            </a:endParaRPr>
-          </a:p>
-        </p:txBody>
-      </p:sp>
-      <p:sp>
-        <p:nvSpPr>
-          <p:cNvPr id="4" name="Action Button: Home 3">
-            <a:hlinkClick r:id="rId3" action="ppaction://hlinksldjump" highlightClick="1"/>
-          </p:cNvPr>
-          <p:cNvSpPr/>
-          <p:nvPr/>
-        </p:nvSpPr>
-        <p:spPr>
-          <a:xfrm>
-            <a:off x="11660863" y="188793"/>
-            <a:ext cx="352663" cy="352663"/>
-          </a:xfrm>
-          <a:prstGeom prst="actionButtonHome">
-            <a:avLst/>
-          </a:prstGeom>
-        </p:spPr>
-        <p:style>
-          <a:lnRef idx="2">
-            <a:schemeClr val="dk1"/>
-          </a:lnRef>
-          <a:fillRef idx="1">
-            <a:schemeClr val="lt1"/>
-          </a:fillRef>
-          <a:effectRef idx="0">
-            <a:schemeClr val="dk1"/>
-          </a:effectRef>
-          <a:fontRef idx="minor">
-            <a:schemeClr val="dk1"/>
-          </a:fontRef>
-        </p:style>
-        <p:txBody>
-          <a:bodyPr rtlCol="0" anchor="ctr"/>
-          <a:lstStyle/>
-          <a:p>
-            <a:pPr algn="ctr"/>
-            <a:endParaRPr lang="en-US"/>
-          </a:p>
-        </p:txBody>
-      </p:sp>
-    </p:spTree>
-    <p:extLst>
-      <p:ext uri="{BB962C8B-B14F-4D97-AF65-F5344CB8AC3E}">
-        <p14:creationId xmlns:p14="http://schemas.microsoft.com/office/powerpoint/2010/main" val="2475544307"/>
-      </p:ext>
-    </p:extLst>
-  </p:cSld>
-  <p:clrMapOvr>
-    <a:masterClrMapping/>
-  </p:clrMapOvr>
-  <p:timing>
-    <p:tnLst>
-      <p:par>
-        <p:cTn id="1" dur="indefinite" restart="never" nodeType="tmRoot"/>
-      </p:par>
-    </p:tnLst>
-  </p:timing>
-</p:sld>
-</file>
-
 <file path=ppt/slides/slide6.xml><?xml version="1.0" encoding="utf-8"?>
 <p:sld xmlns:a="http://schemas.openxmlformats.org/drawingml/2006/main" xmlns:r="http://schemas.openxmlformats.org/officeDocument/2006/relationships" xmlns:p="http://schemas.openxmlformats.org/presentationml/2006/main">
   <p:cSld>
@@ -19625,7 +21726,7 @@
           <a:p>
             <a:r>
               <a:rPr lang="en-US" dirty="0" smtClean="0"/>
-              <a:t>Sensing Concept</a:t>
+              <a:t>Secure Kernel</a:t>
             </a:r>
             <a:endParaRPr lang="en-US" dirty="0"/>
           </a:p>
@@ -19641,218 +21742,154 @@
             <p:ph idx="1"/>
           </p:nvPr>
         </p:nvSpPr>
-        <p:spPr>
-          <a:xfrm>
-            <a:off x="838200" y="1393794"/>
-            <a:ext cx="10515600" cy="4783169"/>
-          </a:xfrm>
-        </p:spPr>
-        <p:txBody>
-          <a:bodyPr>
-            <a:normAutofit fontScale="77500" lnSpcReduction="20000"/>
-          </a:bodyPr>
+        <p:spPr/>
+        <p:txBody>
+          <a:bodyPr/>
           <a:lstStyle/>
           <a:p>
             <a:r>
               <a:rPr lang="en-US" dirty="0" smtClean="0"/>
-              <a:t>Monitor </a:t>
-            </a:r>
-            <a:r>
-              <a:rPr lang="en-US" dirty="0"/>
-              <a:t>execution at three layers:</a:t>
+              <a:t>Apply a set of security-related configuration options</a:t>
             </a:r>
           </a:p>
           <a:p>
             <a:pPr lvl="1"/>
             <a:r>
-              <a:rPr lang="en-US" dirty="0" err="1" smtClean="0"/>
-              <a:t>CrossOver</a:t>
-            </a:r>
+              <a:rPr lang="en-US" sz="2000" dirty="0" smtClean="0">
+                <a:hlinkClick r:id="rId2"/>
+              </a:rPr>
+              <a:t>https://kernsec.org/wiki/index.php/Kernel_Self_Protection_Project/Recommended_Settings</a:t>
+            </a:r>
+            <a:endParaRPr lang="en-US" sz="2000" dirty="0" smtClean="0"/>
+          </a:p>
+          <a:p>
             <a:r>
               <a:rPr lang="en-US" dirty="0" smtClean="0"/>
+              <a:t>Examples:</a:t>
+            </a:r>
+          </a:p>
+          <a:p>
+            <a:pPr lvl="1"/>
+            <a:r>
+              <a:rPr lang="en-US" sz="1800" dirty="0" smtClean="0">
+                <a:latin typeface="Hack" panose="020B0609030202020204" pitchFamily="49" charset="0"/>
+                <a:ea typeface="Hack" panose="020B0609030202020204" pitchFamily="49" charset="0"/>
+                <a:cs typeface="Hack" panose="020B0609030202020204" pitchFamily="49" charset="0"/>
+              </a:rPr>
+              <a:t>CONFIG_DEBUG_WX=y       # report memory pages marked write + exec</a:t>
+            </a:r>
+          </a:p>
+          <a:p>
+            <a:pPr lvl="1"/>
+            <a:r>
+              <a:rPr lang="en-US" sz="1800" dirty="0" smtClean="0">
+                <a:latin typeface="Hack" panose="020B0609030202020204" pitchFamily="49" charset="0"/>
+                <a:ea typeface="Hack" panose="020B0609030202020204" pitchFamily="49" charset="0"/>
+                <a:cs typeface="Hack" panose="020B0609030202020204" pitchFamily="49" charset="0"/>
+              </a:rPr>
+              <a:t>CONFIG_PROC_KCORE=n     # disable virtual kernel core dumps</a:t>
+            </a:r>
+          </a:p>
+          <a:p>
+            <a:pPr lvl="1"/>
+            <a:r>
+              <a:rPr lang="en-US" sz="1800" dirty="0" smtClean="0">
+                <a:latin typeface="Hack" panose="020B0609030202020204" pitchFamily="49" charset="0"/>
+                <a:ea typeface="Hack" panose="020B0609030202020204" pitchFamily="49" charset="0"/>
+                <a:cs typeface="Hack" panose="020B0609030202020204" pitchFamily="49" charset="0"/>
+              </a:rPr>
+              <a:t>CONFIG_STRICT_DEVMEM=y  # enforce strict access to /dev/mem</a:t>
+            </a:r>
+          </a:p>
+          <a:p>
+            <a:pPr lvl="1"/>
+            <a:r>
+              <a:rPr lang="en-US" sz="1800" dirty="0" smtClean="0">
+                <a:latin typeface="Hack" panose="020B0609030202020204" pitchFamily="49" charset="0"/>
+                <a:ea typeface="Hack" panose="020B0609030202020204" pitchFamily="49" charset="0"/>
+                <a:cs typeface="Hack" panose="020B0609030202020204" pitchFamily="49" charset="0"/>
+              </a:rPr>
+              <a:t>CONFIG_KGDB=n           # disable kernel debugger</a:t>
+            </a:r>
+          </a:p>
+          <a:p>
+            <a:pPr lvl="1"/>
+            <a:r>
+              <a:rPr lang="en-US" sz="1800" dirty="0" smtClean="0">
+                <a:latin typeface="Hack" panose="020B0609030202020204" pitchFamily="49" charset="0"/>
+                <a:ea typeface="Hack" panose="020B0609030202020204" pitchFamily="49" charset="0"/>
+                <a:cs typeface="Hack" panose="020B0609030202020204" pitchFamily="49" charset="0"/>
+              </a:rPr>
+              <a:t>CONFIG_HIBERNATION=n    # disable hibernation</a:t>
+            </a:r>
+          </a:p>
+          <a:p>
+            <a:pPr lvl="1"/>
+            <a:r>
+              <a:rPr lang="en-US" sz="1800" dirty="0" smtClean="0">
+                <a:latin typeface="Hack" panose="020B0609030202020204" pitchFamily="49" charset="0"/>
+                <a:ea typeface="Hack" panose="020B0609030202020204" pitchFamily="49" charset="0"/>
+                <a:cs typeface="Hack" panose="020B0609030202020204" pitchFamily="49" charset="0"/>
+              </a:rPr>
+              <a:t>CONFIG_BPF_JIT=n</a:t>
+            </a:r>
+            <a:r>
+              <a:rPr lang="en-US" sz="1800" dirty="0">
+                <a:latin typeface="Hack" panose="020B0609030202020204" pitchFamily="49" charset="0"/>
+                <a:ea typeface="Hack" panose="020B0609030202020204" pitchFamily="49" charset="0"/>
+                <a:cs typeface="Hack" panose="020B0609030202020204" pitchFamily="49" charset="0"/>
+              </a:rPr>
               <a:t> </a:t>
             </a:r>
             <a:r>
-              <a:rPr lang="en-US" dirty="0" err="1"/>
-              <a:t>WinAPI</a:t>
-            </a:r>
-            <a:r>
-              <a:rPr lang="en-US" dirty="0"/>
-              <a:t> emulation layer (CX</a:t>
-            </a:r>
+              <a:rPr lang="en-US" sz="1800" dirty="0" smtClean="0">
+                <a:latin typeface="Hack" panose="020B0609030202020204" pitchFamily="49" charset="0"/>
+                <a:ea typeface="Hack" panose="020B0609030202020204" pitchFamily="49" charset="0"/>
+                <a:cs typeface="Hack" panose="020B0609030202020204" pitchFamily="49" charset="0"/>
+              </a:rPr>
+              <a:t>       # disable BPF JIT, used in </a:t>
+            </a:r>
+            <a:r>
+              <a:rPr lang="en-US" sz="1800" dirty="0" err="1" smtClean="0">
+                <a:latin typeface="Hack" panose="020B0609030202020204" pitchFamily="49" charset="0"/>
+                <a:ea typeface="Hack" panose="020B0609030202020204" pitchFamily="49" charset="0"/>
+                <a:cs typeface="Hack" panose="020B0609030202020204" pitchFamily="49" charset="0"/>
+              </a:rPr>
+              <a:t>Spectre</a:t>
+            </a:r>
+            <a:r>
+              <a:rPr lang="en-US" sz="1800" dirty="0" smtClean="0">
+                <a:latin typeface="Hack" panose="020B0609030202020204" pitchFamily="49" charset="0"/>
+                <a:ea typeface="Hack" panose="020B0609030202020204" pitchFamily="49" charset="0"/>
+                <a:cs typeface="Hack" panose="020B0609030202020204" pitchFamily="49" charset="0"/>
+              </a:rPr>
+              <a:t> attacks</a:t>
+            </a:r>
+            <a:endParaRPr lang="en-US" sz="1800" dirty="0">
+              <a:latin typeface="Hack" panose="020B0609030202020204" pitchFamily="49" charset="0"/>
+              <a:ea typeface="Hack" panose="020B0609030202020204" pitchFamily="49" charset="0"/>
+              <a:cs typeface="Hack" panose="020B0609030202020204" pitchFamily="49" charset="0"/>
+            </a:endParaRPr>
+          </a:p>
+          <a:p>
             <a:r>
               <a:rPr lang="en-US" dirty="0" smtClean="0"/>
-              <a:t>): monitor by hooking </a:t>
-            </a:r>
-            <a:r>
-              <a:rPr lang="en-US" dirty="0" err="1" smtClean="0"/>
-              <a:t>WineServer</a:t>
-            </a:r>
-            <a:r>
-              <a:rPr lang="en-US" dirty="0" smtClean="0"/>
-              <a:t> component</a:t>
-            </a:r>
-            <a:endParaRPr lang="en-US" dirty="0"/>
-          </a:p>
-          <a:p>
-            <a:pPr lvl="1"/>
-            <a:r>
-              <a:rPr lang="en-US" dirty="0" smtClean="0"/>
-              <a:t>Linux </a:t>
-            </a:r>
-            <a:r>
-              <a:rPr lang="en-US" dirty="0"/>
-              <a:t>Security Module (LSM</a:t>
-            </a:r>
-            <a:r>
-              <a:rPr lang="en-US" dirty="0" smtClean="0"/>
-              <a:t>): monitor at LSM sensor/audit points </a:t>
-            </a:r>
-            <a:endParaRPr lang="en-US" dirty="0"/>
-          </a:p>
-          <a:p>
-            <a:pPr lvl="1"/>
-            <a:r>
-              <a:rPr lang="en-US" dirty="0" smtClean="0"/>
-              <a:t>Nested Hypervisor: monitor fundamental activities (storage, network, Unity starts/stops)</a:t>
-            </a:r>
-            <a:endParaRPr lang="en-US" dirty="0"/>
-          </a:p>
-          <a:p>
-            <a:r>
-              <a:rPr lang="en-US" dirty="0" smtClean="0"/>
-              <a:t>Currently </a:t>
-            </a:r>
-            <a:r>
-              <a:rPr lang="en-US" dirty="0"/>
-              <a:t>logging to syslog and relaying them via syslog-ng to ElasticSearch</a:t>
-            </a:r>
-          </a:p>
-          <a:p>
-            <a:pPr lvl="1"/>
-            <a:r>
-              <a:rPr lang="en-US" dirty="0" smtClean="0"/>
-              <a:t>Allows </a:t>
-            </a:r>
-            <a:r>
-              <a:rPr lang="en-US" dirty="0"/>
-              <a:t>for mutual authentication via certificates created at provisioning time</a:t>
-            </a:r>
-          </a:p>
-          <a:p>
-            <a:pPr lvl="1"/>
-            <a:r>
-              <a:rPr lang="en-US" dirty="0" smtClean="0"/>
-              <a:t>Easy-mode </a:t>
-            </a:r>
-            <a:r>
-              <a:rPr lang="en-US" dirty="0"/>
-              <a:t>visualization of results via </a:t>
-            </a:r>
-            <a:r>
-              <a:rPr lang="en-US" dirty="0" err="1" smtClean="0"/>
-              <a:t>Kibana</a:t>
-            </a:r>
-            <a:endParaRPr lang="en-US" dirty="0" smtClean="0"/>
-          </a:p>
-          <a:p>
-            <a:pPr lvl="1"/>
-            <a:r>
-              <a:rPr lang="en-US" dirty="0" smtClean="0"/>
-              <a:t>Multiple co-located Unity instances send to a local aggregation point, running as a separate </a:t>
-            </a:r>
-            <a:r>
-              <a:rPr lang="en-US" dirty="0" err="1" smtClean="0"/>
-              <a:t>domU</a:t>
-            </a:r>
-            <a:endParaRPr lang="en-US" dirty="0"/>
-          </a:p>
-          <a:p>
-            <a:pPr lvl="1"/>
-            <a:r>
-              <a:rPr lang="en-US" dirty="0" smtClean="0"/>
-              <a:t>Integration </a:t>
-            </a:r>
-            <a:r>
-              <a:rPr lang="en-US" dirty="0"/>
-              <a:t>into other systems is straight forward</a:t>
-            </a:r>
-          </a:p>
-          <a:p>
-            <a:r>
-              <a:rPr lang="en-US" dirty="0" smtClean="0"/>
-              <a:t>Backend </a:t>
-            </a:r>
-            <a:r>
-              <a:rPr lang="en-US" dirty="0"/>
-              <a:t>design is still to be finalized, but trying to stick to well-known </a:t>
-            </a:r>
-            <a:r>
-              <a:rPr lang="en-US" dirty="0" smtClean="0"/>
-              <a:t>tooling to </a:t>
-            </a:r>
-            <a:r>
-              <a:rPr lang="en-US" dirty="0"/>
-              <a:t>aid in adoption. Easy to replace current stuff with more performant versions </a:t>
-            </a:r>
-            <a:r>
-              <a:rPr lang="en-US" dirty="0" smtClean="0"/>
-              <a:t>if </a:t>
-            </a:r>
-            <a:r>
-              <a:rPr lang="en-US" dirty="0"/>
-              <a:t>necessary.</a:t>
-            </a:r>
-          </a:p>
-          <a:p>
-            <a:r>
-              <a:rPr lang="en-US" dirty="0" smtClean="0"/>
-              <a:t>Currently </a:t>
-            </a:r>
-            <a:r>
-              <a:rPr lang="en-US" dirty="0"/>
-              <a:t>developing CX and LSM monitoring</a:t>
-            </a:r>
-          </a:p>
-          <a:p>
-            <a:pPr lvl="1"/>
-            <a:r>
-              <a:rPr lang="en-US" dirty="0" smtClean="0"/>
-              <a:t>Can </a:t>
-            </a:r>
-            <a:r>
-              <a:rPr lang="en-US" dirty="0"/>
-              <a:t>intercept file operations at both CX and LSM layer</a:t>
-            </a:r>
-          </a:p>
-          <a:p>
-            <a:pPr lvl="1"/>
-            <a:r>
-              <a:rPr lang="en-US" dirty="0" smtClean="0"/>
-              <a:t>Working </a:t>
-            </a:r>
-            <a:r>
-              <a:rPr lang="en-US" dirty="0"/>
-              <a:t>on networking next</a:t>
-            </a:r>
-          </a:p>
-          <a:p>
-            <a:pPr lvl="1"/>
-            <a:r>
-              <a:rPr lang="en-US" dirty="0" smtClean="0"/>
-              <a:t>Wide </a:t>
-            </a:r>
-            <a:r>
-              <a:rPr lang="en-US" dirty="0"/>
-              <a:t>variety of "badge-check" kinds of events that we can implement</a:t>
-            </a:r>
+              <a:t>Future:</a:t>
+            </a:r>
+          </a:p>
+          <a:p>
+            <a:endParaRPr lang="en-US" sz="2200" dirty="0" smtClean="0">
+              <a:latin typeface="Hack" panose="020B0609030202020204" pitchFamily="49" charset="0"/>
+              <a:ea typeface="Hack" panose="020B0609030202020204" pitchFamily="49" charset="0"/>
+              <a:cs typeface="Hack" panose="020B0609030202020204" pitchFamily="49" charset="0"/>
+            </a:endParaRPr>
           </a:p>
         </p:txBody>
       </p:sp>
       <p:sp>
         <p:nvSpPr>
           <p:cNvPr id="4" name="Action Button: Home 3">
-            <a:hlinkClick r:id="rId2" action="ppaction://hlinksldjump" highlightClick="1"/>
+            <a:hlinkClick r:id="rId3" action="ppaction://hlinksldjump" highlightClick="1"/>
           </p:cNvPr>
           <p:cNvSpPr/>
           <p:nvPr/>
@@ -19892,7 +21929,7 @@
     </p:spTree>
     <p:extLst>
       <p:ext uri="{BB962C8B-B14F-4D97-AF65-F5344CB8AC3E}">
-        <p14:creationId xmlns:p14="http://schemas.microsoft.com/office/powerpoint/2010/main" val="1373758518"/>
+        <p14:creationId xmlns:p14="http://schemas.microsoft.com/office/powerpoint/2010/main" val="2475544307"/>
       </p:ext>
     </p:extLst>
   </p:cSld>
@@ -19943,6 +21980,324 @@
           <a:p>
             <a:r>
               <a:rPr lang="en-US" dirty="0" smtClean="0"/>
+              <a:t>Sensing Concept</a:t>
+            </a:r>
+            <a:endParaRPr lang="en-US" dirty="0"/>
+          </a:p>
+        </p:txBody>
+      </p:sp>
+      <p:sp>
+        <p:nvSpPr>
+          <p:cNvPr id="3" name="Content Placeholder 2"/>
+          <p:cNvSpPr>
+            <a:spLocks noGrp="1"/>
+          </p:cNvSpPr>
+          <p:nvPr>
+            <p:ph idx="1"/>
+          </p:nvPr>
+        </p:nvSpPr>
+        <p:spPr>
+          <a:xfrm>
+            <a:off x="838200" y="1393794"/>
+            <a:ext cx="10515600" cy="4783169"/>
+          </a:xfrm>
+        </p:spPr>
+        <p:txBody>
+          <a:bodyPr>
+            <a:normAutofit fontScale="77500" lnSpcReduction="20000"/>
+          </a:bodyPr>
+          <a:lstStyle/>
+          <a:p>
+            <a:r>
+              <a:rPr lang="en-US" dirty="0" smtClean="0"/>
+              <a:t>Monitor </a:t>
+            </a:r>
+            <a:r>
+              <a:rPr lang="en-US" dirty="0"/>
+              <a:t>execution at three layers:</a:t>
+            </a:r>
+          </a:p>
+          <a:p>
+            <a:pPr lvl="1"/>
+            <a:r>
+              <a:rPr lang="en-US" dirty="0" err="1" smtClean="0"/>
+              <a:t>CrossOver</a:t>
+            </a:r>
+            <a:r>
+              <a:rPr lang="en-US" dirty="0" smtClean="0"/>
+              <a:t> </a:t>
+            </a:r>
+            <a:r>
+              <a:rPr lang="en-US" dirty="0" err="1"/>
+              <a:t>WinAPI</a:t>
+            </a:r>
+            <a:r>
+              <a:rPr lang="en-US" dirty="0"/>
+              <a:t> emulation layer (CX</a:t>
+            </a:r>
+            <a:r>
+              <a:rPr lang="en-US" dirty="0" smtClean="0"/>
+              <a:t>): monitor by hooking </a:t>
+            </a:r>
+            <a:r>
+              <a:rPr lang="en-US" dirty="0" err="1" smtClean="0"/>
+              <a:t>WineServer</a:t>
+            </a:r>
+            <a:r>
+              <a:rPr lang="en-US" dirty="0" smtClean="0"/>
+              <a:t> component</a:t>
+            </a:r>
+            <a:endParaRPr lang="en-US" dirty="0"/>
+          </a:p>
+          <a:p>
+            <a:pPr lvl="1"/>
+            <a:r>
+              <a:rPr lang="en-US" dirty="0" smtClean="0"/>
+              <a:t>Linux </a:t>
+            </a:r>
+            <a:r>
+              <a:rPr lang="en-US" dirty="0"/>
+              <a:t>Security Module (LSM</a:t>
+            </a:r>
+            <a:r>
+              <a:rPr lang="en-US" dirty="0" smtClean="0"/>
+              <a:t>): monitor at LSM sensor/audit points </a:t>
+            </a:r>
+            <a:endParaRPr lang="en-US" dirty="0"/>
+          </a:p>
+          <a:p>
+            <a:pPr lvl="1"/>
+            <a:r>
+              <a:rPr lang="en-US" dirty="0" smtClean="0"/>
+              <a:t>Nested Hypervisor: monitor fundamental activities (storage, network, Unity starts/stops)</a:t>
+            </a:r>
+            <a:endParaRPr lang="en-US" dirty="0"/>
+          </a:p>
+          <a:p>
+            <a:r>
+              <a:rPr lang="en-US" dirty="0" smtClean="0"/>
+              <a:t>Currently </a:t>
+            </a:r>
+            <a:r>
+              <a:rPr lang="en-US" dirty="0"/>
+              <a:t>logging to syslog and relaying them via syslog-ng to ElasticSearch</a:t>
+            </a:r>
+          </a:p>
+          <a:p>
+            <a:pPr lvl="1"/>
+            <a:r>
+              <a:rPr lang="en-US" dirty="0" smtClean="0"/>
+              <a:t>Allows </a:t>
+            </a:r>
+            <a:r>
+              <a:rPr lang="en-US" dirty="0"/>
+              <a:t>for mutual authentication via certificates created at provisioning time</a:t>
+            </a:r>
+          </a:p>
+          <a:p>
+            <a:pPr lvl="1"/>
+            <a:r>
+              <a:rPr lang="en-US" dirty="0" smtClean="0"/>
+              <a:t>Easy-mode </a:t>
+            </a:r>
+            <a:r>
+              <a:rPr lang="en-US" dirty="0"/>
+              <a:t>visualization of results via </a:t>
+            </a:r>
+            <a:r>
+              <a:rPr lang="en-US" dirty="0" err="1" smtClean="0"/>
+              <a:t>Kibana</a:t>
+            </a:r>
+            <a:endParaRPr lang="en-US" dirty="0" smtClean="0"/>
+          </a:p>
+          <a:p>
+            <a:pPr lvl="1"/>
+            <a:r>
+              <a:rPr lang="en-US" dirty="0" smtClean="0"/>
+              <a:t>Multiple co-located Unity instances send to a local aggregation point, running as a separate </a:t>
+            </a:r>
+            <a:r>
+              <a:rPr lang="en-US" dirty="0" err="1" smtClean="0"/>
+              <a:t>domU</a:t>
+            </a:r>
+            <a:endParaRPr lang="en-US" dirty="0"/>
+          </a:p>
+          <a:p>
+            <a:pPr lvl="1"/>
+            <a:r>
+              <a:rPr lang="en-US" dirty="0" smtClean="0"/>
+              <a:t>Integration </a:t>
+            </a:r>
+            <a:r>
+              <a:rPr lang="en-US" dirty="0"/>
+              <a:t>into other systems is straight forward</a:t>
+            </a:r>
+          </a:p>
+          <a:p>
+            <a:r>
+              <a:rPr lang="en-US" dirty="0" smtClean="0"/>
+              <a:t>Backend </a:t>
+            </a:r>
+            <a:r>
+              <a:rPr lang="en-US" dirty="0"/>
+              <a:t>design is still to be finalized, but trying to stick to well-known </a:t>
+            </a:r>
+            <a:r>
+              <a:rPr lang="en-US" dirty="0" smtClean="0"/>
+              <a:t>tooling to </a:t>
+            </a:r>
+            <a:r>
+              <a:rPr lang="en-US" dirty="0"/>
+              <a:t>aid in adoption. Easy to replace current stuff with more performant versions </a:t>
+            </a:r>
+            <a:r>
+              <a:rPr lang="en-US" dirty="0" smtClean="0"/>
+              <a:t>if </a:t>
+            </a:r>
+            <a:r>
+              <a:rPr lang="en-US" dirty="0"/>
+              <a:t>necessary.</a:t>
+            </a:r>
+          </a:p>
+          <a:p>
+            <a:r>
+              <a:rPr lang="en-US" dirty="0" smtClean="0"/>
+              <a:t>Currently </a:t>
+            </a:r>
+            <a:r>
+              <a:rPr lang="en-US" dirty="0"/>
+              <a:t>developing CX and LSM monitoring</a:t>
+            </a:r>
+          </a:p>
+          <a:p>
+            <a:pPr lvl="1"/>
+            <a:r>
+              <a:rPr lang="en-US" dirty="0" smtClean="0"/>
+              <a:t>Can </a:t>
+            </a:r>
+            <a:r>
+              <a:rPr lang="en-US" dirty="0"/>
+              <a:t>intercept file operations at both CX and LSM layer</a:t>
+            </a:r>
+          </a:p>
+          <a:p>
+            <a:pPr lvl="1"/>
+            <a:r>
+              <a:rPr lang="en-US" dirty="0" smtClean="0"/>
+              <a:t>Working </a:t>
+            </a:r>
+            <a:r>
+              <a:rPr lang="en-US" dirty="0"/>
+              <a:t>on networking next</a:t>
+            </a:r>
+          </a:p>
+          <a:p>
+            <a:pPr lvl="1"/>
+            <a:r>
+              <a:rPr lang="en-US" dirty="0" smtClean="0"/>
+              <a:t>Wide </a:t>
+            </a:r>
+            <a:r>
+              <a:rPr lang="en-US" dirty="0"/>
+              <a:t>variety of "badge-check" kinds of events that we can implement</a:t>
+            </a:r>
+          </a:p>
+        </p:txBody>
+      </p:sp>
+      <p:sp>
+        <p:nvSpPr>
+          <p:cNvPr id="4" name="Action Button: Home 3">
+            <a:hlinkClick r:id="rId2" action="ppaction://hlinksldjump" highlightClick="1"/>
+          </p:cNvPr>
+          <p:cNvSpPr/>
+          <p:nvPr/>
+        </p:nvSpPr>
+        <p:spPr>
+          <a:xfrm>
+            <a:off x="11660863" y="188793"/>
+            <a:ext cx="352663" cy="352663"/>
+          </a:xfrm>
+          <a:prstGeom prst="actionButtonHome">
+            <a:avLst/>
+          </a:prstGeom>
+        </p:spPr>
+        <p:style>
+          <a:lnRef idx="2">
+            <a:schemeClr val="dk1"/>
+          </a:lnRef>
+          <a:fillRef idx="1">
+            <a:schemeClr val="lt1"/>
+          </a:fillRef>
+          <a:effectRef idx="0">
+            <a:schemeClr val="dk1"/>
+          </a:effectRef>
+          <a:fontRef idx="minor">
+            <a:schemeClr val="dk1"/>
+          </a:fontRef>
+        </p:style>
+        <p:txBody>
+          <a:bodyPr rtlCol="0" anchor="ctr"/>
+          <a:lstStyle/>
+          <a:p>
+            <a:pPr algn="ctr"/>
+            <a:endParaRPr lang="en-US"/>
+          </a:p>
+        </p:txBody>
+      </p:sp>
+    </p:spTree>
+    <p:extLst>
+      <p:ext uri="{BB962C8B-B14F-4D97-AF65-F5344CB8AC3E}">
+        <p14:creationId xmlns:p14="http://schemas.microsoft.com/office/powerpoint/2010/main" val="1373758518"/>
+      </p:ext>
+    </p:extLst>
+  </p:cSld>
+  <p:clrMapOvr>
+    <a:masterClrMapping/>
+  </p:clrMapOvr>
+  <p:timing>
+    <p:tnLst>
+      <p:par>
+        <p:cTn id="1" dur="indefinite" restart="never" nodeType="tmRoot"/>
+      </p:par>
+    </p:tnLst>
+  </p:timing>
+</p:sld>
+</file>
+
+<file path=ppt/slides/slide8.xml><?xml version="1.0" encoding="utf-8"?>
+<p:sld xmlns:a="http://schemas.openxmlformats.org/drawingml/2006/main" xmlns:r="http://schemas.openxmlformats.org/officeDocument/2006/relationships" xmlns:p="http://schemas.openxmlformats.org/presentationml/2006/main">
+  <p:cSld>
+    <p:spTree>
+      <p:nvGrpSpPr>
+        <p:cNvPr id="1" name=""/>
+        <p:cNvGrpSpPr/>
+        <p:nvPr/>
+      </p:nvGrpSpPr>
+      <p:grpSpPr>
+        <a:xfrm>
+          <a:off x="0" y="0"/>
+          <a:ext cx="0" cy="0"/>
+          <a:chOff x="0" y="0"/>
+          <a:chExt cx="0" cy="0"/>
+        </a:xfrm>
+      </p:grpSpPr>
+      <p:sp>
+        <p:nvSpPr>
+          <p:cNvPr id="2" name="Title 1"/>
+          <p:cNvSpPr>
+            <a:spLocks noGrp="1"/>
+          </p:cNvSpPr>
+          <p:nvPr>
+            <p:ph type="title"/>
+          </p:nvPr>
+        </p:nvSpPr>
+        <p:spPr/>
+        <p:txBody>
+          <a:bodyPr/>
+          <a:lstStyle/>
+          <a:p>
+            <a:r>
+              <a:rPr lang="en-US" dirty="0" smtClean="0"/>
               <a:t>Current Sensing Points</a:t>
             </a:r>
             <a:endParaRPr lang="en-US" dirty="0"/>
@@ -19975,9 +22330,27 @@
                 <a:tableStyleId>{5C22544A-7EE6-4342-B048-85BDC9FD1C3A}</a:tableStyleId>
               </a:tblPr>
               <a:tblGrid>
-                <a:gridCol w="2331678"/>
-                <a:gridCol w="1351642"/>
-                <a:gridCol w="4503418"/>
+                <a:gridCol w="2331678">
+                  <a:extLst>
+                    <a:ext uri="{9D8B030D-6E8A-4147-A177-3AD203B41FA5}">
+                      <a16:colId xmlns:a16="http://schemas.microsoft.com/office/drawing/2014/main" val="20000"/>
+                    </a:ext>
+                  </a:extLst>
+                </a:gridCol>
+                <a:gridCol w="1351642">
+                  <a:extLst>
+                    <a:ext uri="{9D8B030D-6E8A-4147-A177-3AD203B41FA5}">
+                      <a16:colId xmlns:a16="http://schemas.microsoft.com/office/drawing/2014/main" val="20001"/>
+                    </a:ext>
+                  </a:extLst>
+                </a:gridCol>
+                <a:gridCol w="4503418">
+                  <a:extLst>
+                    <a:ext uri="{9D8B030D-6E8A-4147-A177-3AD203B41FA5}">
+                      <a16:colId xmlns:a16="http://schemas.microsoft.com/office/drawing/2014/main" val="20002"/>
+                    </a:ext>
+                  </a:extLst>
+                </a:gridCol>
               </a:tblGrid>
               <a:tr h="370840">
                 <a:tc>
@@ -20022,6 +22395,11 @@
                   </a:txBody>
                   <a:tcPr marL="45057" marR="45057"/>
                 </a:tc>
+                <a:extLst>
+                  <a:ext uri="{0D108BD9-81ED-4DB2-BD59-A6C34878D82A}">
+                    <a16:rowId xmlns:a16="http://schemas.microsoft.com/office/drawing/2014/main" val="10000"/>
+                  </a:ext>
+                </a:extLst>
               </a:tr>
               <a:tr h="370840">
                 <a:tc>
@@ -20112,6 +22490,11 @@
                   </a:txBody>
                   <a:tcPr marL="45057" marR="45057"/>
                 </a:tc>
+                <a:extLst>
+                  <a:ext uri="{0D108BD9-81ED-4DB2-BD59-A6C34878D82A}">
+                    <a16:rowId xmlns:a16="http://schemas.microsoft.com/office/drawing/2014/main" val="10001"/>
+                  </a:ext>
+                </a:extLst>
               </a:tr>
               <a:tr h="370840">
                 <a:tc>
@@ -20172,6 +22555,11 @@
                   </a:txBody>
                   <a:tcPr marL="45057" marR="45057"/>
                 </a:tc>
+                <a:extLst>
+                  <a:ext uri="{0D108BD9-81ED-4DB2-BD59-A6C34878D82A}">
+                    <a16:rowId xmlns:a16="http://schemas.microsoft.com/office/drawing/2014/main" val="10002"/>
+                  </a:ext>
+                </a:extLst>
               </a:tr>
               <a:tr h="370840">
                 <a:tc>
@@ -20250,6 +22638,11 @@
                   </a:txBody>
                   <a:tcPr marL="45057" marR="45057"/>
                 </a:tc>
+                <a:extLst>
+                  <a:ext uri="{0D108BD9-81ED-4DB2-BD59-A6C34878D82A}">
+                    <a16:rowId xmlns:a16="http://schemas.microsoft.com/office/drawing/2014/main" val="10003"/>
+                  </a:ext>
+                </a:extLst>
               </a:tr>
               <a:tr h="370840">
                 <a:tc>
@@ -20306,6 +22699,11 @@
                   </a:txBody>
                   <a:tcPr marL="45057" marR="45057"/>
                 </a:tc>
+                <a:extLst>
+                  <a:ext uri="{0D108BD9-81ED-4DB2-BD59-A6C34878D82A}">
+                    <a16:rowId xmlns:a16="http://schemas.microsoft.com/office/drawing/2014/main" val="10004"/>
+                  </a:ext>
+                </a:extLst>
               </a:tr>
               <a:tr h="370840">
                 <a:tc>
@@ -20424,6 +22822,11 @@
                   </a:txBody>
                   <a:tcPr marL="45057" marR="45057"/>
                 </a:tc>
+                <a:extLst>
+                  <a:ext uri="{0D108BD9-81ED-4DB2-BD59-A6C34878D82A}">
+                    <a16:rowId xmlns:a16="http://schemas.microsoft.com/office/drawing/2014/main" val="10005"/>
+                  </a:ext>
+                </a:extLst>
               </a:tr>
             </a:tbl>
           </a:graphicData>
@@ -20523,7 +22926,7 @@
 </p:sld>
 </file>
 
-<file path=ppt/slides/slide8.xml><?xml version="1.0" encoding="utf-8"?>
+<file path=ppt/slides/slide9.xml><?xml version="1.0" encoding="utf-8"?>
 <p:sld xmlns:a="http://schemas.openxmlformats.org/drawingml/2006/main" xmlns:r="http://schemas.openxmlformats.org/officeDocument/2006/relationships" xmlns:p="http://schemas.openxmlformats.org/presentationml/2006/main">
   <p:cSld>
     <p:spTree>
@@ -22292,801 +24695,6 @@
 </p:sld>
 </file>
 
-<file path=ppt/slides/slide9.xml><?xml version="1.0" encoding="utf-8"?>
-<p:sld xmlns:a="http://schemas.openxmlformats.org/drawingml/2006/main" xmlns:r="http://schemas.openxmlformats.org/officeDocument/2006/relationships" xmlns:p="http://schemas.openxmlformats.org/presentationml/2006/main">
-  <p:cSld>
-    <p:spTree>
-      <p:nvGrpSpPr>
-        <p:cNvPr id="1" name=""/>
-        <p:cNvGrpSpPr/>
-        <p:nvPr/>
-      </p:nvGrpSpPr>
-      <p:grpSpPr>
-        <a:xfrm>
-          <a:off x="0" y="0"/>
-          <a:ext cx="0" cy="0"/>
-          <a:chOff x="0" y="0"/>
-          <a:chExt cx="0" cy="0"/>
-        </a:xfrm>
-      </p:grpSpPr>
-      <p:sp>
-        <p:nvSpPr>
-          <p:cNvPr id="7" name="Rectangle 6"/>
-          <p:cNvSpPr/>
-          <p:nvPr/>
-        </p:nvSpPr>
-        <p:spPr>
-          <a:xfrm>
-            <a:off x="9241653" y="1908703"/>
-            <a:ext cx="2290439" cy="1821662"/>
-          </a:xfrm>
-          <a:prstGeom prst="rect">
-            <a:avLst/>
-          </a:prstGeom>
-        </p:spPr>
-        <p:style>
-          <a:lnRef idx="2">
-            <a:schemeClr val="accent6">
-              <a:shade val="50000"/>
-            </a:schemeClr>
-          </a:lnRef>
-          <a:fillRef idx="1">
-            <a:schemeClr val="accent6"/>
-          </a:fillRef>
-          <a:effectRef idx="0">
-            <a:schemeClr val="accent6"/>
-          </a:effectRef>
-          <a:fontRef idx="minor">
-            <a:schemeClr val="lt1"/>
-          </a:fontRef>
-        </p:style>
-        <p:txBody>
-          <a:bodyPr rtlCol="0" anchor="ctr"/>
-          <a:lstStyle/>
-          <a:p>
-            <a:pPr algn="ctr"/>
-            <a:r>
-              <a:rPr lang="en-US" sz="3200" dirty="0" smtClean="0"/>
-              <a:t>Excalibur</a:t>
-            </a:r>
-            <a:endParaRPr lang="en-US" sz="3200" dirty="0"/>
-          </a:p>
-        </p:txBody>
-      </p:sp>
-      <p:pic>
-        <p:nvPicPr>
-          <p:cNvPr id="9" name="Picture 8"/>
-          <p:cNvPicPr>
-            <a:picLocks noChangeAspect="1"/>
-          </p:cNvPicPr>
-          <p:nvPr/>
-        </p:nvPicPr>
-        <p:blipFill>
-          <a:blip r:embed="rId2"/>
-          <a:stretch>
-            <a:fillRect/>
-          </a:stretch>
-        </p:blipFill>
-        <p:spPr>
-          <a:xfrm>
-            <a:off x="739893" y="2022449"/>
-            <a:ext cx="2034038" cy="1534177"/>
-          </a:xfrm>
-          <a:prstGeom prst="rect">
-            <a:avLst/>
-          </a:prstGeom>
-        </p:spPr>
-      </p:pic>
-      <p:pic>
-        <p:nvPicPr>
-          <p:cNvPr id="10" name="Picture 9"/>
-          <p:cNvPicPr>
-            <a:picLocks noChangeAspect="1"/>
-          </p:cNvPicPr>
-          <p:nvPr/>
-        </p:nvPicPr>
-        <p:blipFill>
-          <a:blip r:embed="rId2"/>
-          <a:stretch>
-            <a:fillRect/>
-          </a:stretch>
-        </p:blipFill>
-        <p:spPr>
-          <a:xfrm>
-            <a:off x="739893" y="3556626"/>
-            <a:ext cx="2034038" cy="1534177"/>
-          </a:xfrm>
-          <a:prstGeom prst="rect">
-            <a:avLst/>
-          </a:prstGeom>
-        </p:spPr>
-      </p:pic>
-      <p:pic>
-        <p:nvPicPr>
-          <p:cNvPr id="39" name="Picture 38"/>
-          <p:cNvPicPr>
-            <a:picLocks noChangeAspect="1"/>
-          </p:cNvPicPr>
-          <p:nvPr/>
-        </p:nvPicPr>
-        <p:blipFill>
-          <a:blip r:embed="rId2"/>
-          <a:stretch>
-            <a:fillRect/>
-          </a:stretch>
-        </p:blipFill>
-        <p:spPr>
-          <a:xfrm>
-            <a:off x="3056965" y="5234506"/>
-            <a:ext cx="2034038" cy="1534177"/>
-          </a:xfrm>
-          <a:prstGeom prst="rect">
-            <a:avLst/>
-          </a:prstGeom>
-        </p:spPr>
-      </p:pic>
-      <p:pic>
-        <p:nvPicPr>
-          <p:cNvPr id="40" name="Picture 39"/>
-          <p:cNvPicPr>
-            <a:picLocks noChangeAspect="1"/>
-          </p:cNvPicPr>
-          <p:nvPr/>
-        </p:nvPicPr>
-        <p:blipFill>
-          <a:blip r:embed="rId2"/>
-          <a:stretch>
-            <a:fillRect/>
-          </a:stretch>
-        </p:blipFill>
-        <p:spPr>
-          <a:xfrm>
-            <a:off x="5516080" y="5234506"/>
-            <a:ext cx="2034038" cy="1534177"/>
-          </a:xfrm>
-          <a:prstGeom prst="rect">
-            <a:avLst/>
-          </a:prstGeom>
-        </p:spPr>
-      </p:pic>
-      <p:pic>
-        <p:nvPicPr>
-          <p:cNvPr id="41" name="Picture 40"/>
-          <p:cNvPicPr>
-            <a:picLocks noChangeAspect="1"/>
-          </p:cNvPicPr>
-          <p:nvPr/>
-        </p:nvPicPr>
-        <p:blipFill>
-          <a:blip r:embed="rId3"/>
-          <a:stretch>
-            <a:fillRect/>
-          </a:stretch>
-        </p:blipFill>
-        <p:spPr>
-          <a:xfrm>
-            <a:off x="3511759" y="2133081"/>
-            <a:ext cx="774344" cy="1312911"/>
-          </a:xfrm>
-          <a:prstGeom prst="rect">
-            <a:avLst/>
-          </a:prstGeom>
-        </p:spPr>
-      </p:pic>
-      <p:pic>
-        <p:nvPicPr>
-          <p:cNvPr id="42" name="Picture 41"/>
-          <p:cNvPicPr>
-            <a:picLocks noChangeAspect="1"/>
-          </p:cNvPicPr>
-          <p:nvPr/>
-        </p:nvPicPr>
-        <p:blipFill>
-          <a:blip r:embed="rId3"/>
-          <a:stretch>
-            <a:fillRect/>
-          </a:stretch>
-        </p:blipFill>
-        <p:spPr>
-          <a:xfrm>
-            <a:off x="4887798" y="3683794"/>
-            <a:ext cx="774344" cy="1312911"/>
-          </a:xfrm>
-          <a:prstGeom prst="rect">
-            <a:avLst/>
-          </a:prstGeom>
-        </p:spPr>
-      </p:pic>
-      <p:pic>
-        <p:nvPicPr>
-          <p:cNvPr id="43" name="Picture 42"/>
-          <p:cNvPicPr>
-            <a:picLocks noChangeAspect="1"/>
-          </p:cNvPicPr>
-          <p:nvPr/>
-        </p:nvPicPr>
-        <p:blipFill>
-          <a:blip r:embed="rId3"/>
-          <a:stretch>
-            <a:fillRect/>
-          </a:stretch>
-        </p:blipFill>
-        <p:spPr>
-          <a:xfrm>
-            <a:off x="4887798" y="381300"/>
-            <a:ext cx="774344" cy="1312911"/>
-          </a:xfrm>
-          <a:prstGeom prst="rect">
-            <a:avLst/>
-          </a:prstGeom>
-        </p:spPr>
-      </p:pic>
-      <p:pic>
-        <p:nvPicPr>
-          <p:cNvPr id="44" name="Picture 43"/>
-          <p:cNvPicPr>
-            <a:picLocks noChangeAspect="1"/>
-          </p:cNvPicPr>
-          <p:nvPr/>
-        </p:nvPicPr>
-        <p:blipFill>
-          <a:blip r:embed="rId3"/>
-          <a:stretch>
-            <a:fillRect/>
-          </a:stretch>
-        </p:blipFill>
-        <p:spPr>
-          <a:xfrm>
-            <a:off x="6228326" y="381300"/>
-            <a:ext cx="774344" cy="1312911"/>
-          </a:xfrm>
-          <a:prstGeom prst="rect">
-            <a:avLst/>
-          </a:prstGeom>
-        </p:spPr>
-      </p:pic>
-      <p:cxnSp>
-        <p:nvCxnSpPr>
-          <p:cNvPr id="48" name="Straight Arrow Connector 47"/>
-          <p:cNvCxnSpPr>
-            <a:stCxn id="9" idx="3"/>
-            <a:endCxn id="41" idx="1"/>
-          </p:cNvCxnSpPr>
-          <p:nvPr/>
-        </p:nvCxnSpPr>
-        <p:spPr>
-          <a:xfrm flipV="1">
-            <a:off x="2773931" y="2789537"/>
-            <a:ext cx="737828" cy="1"/>
-          </a:xfrm>
-          <a:prstGeom prst="straightConnector1">
-            <a:avLst/>
-          </a:prstGeom>
-          <a:ln>
-            <a:tailEnd type="triangle"/>
-          </a:ln>
-        </p:spPr>
-        <p:style>
-          <a:lnRef idx="1">
-            <a:schemeClr val="accent1"/>
-          </a:lnRef>
-          <a:fillRef idx="0">
-            <a:schemeClr val="accent1"/>
-          </a:fillRef>
-          <a:effectRef idx="0">
-            <a:schemeClr val="accent1"/>
-          </a:effectRef>
-          <a:fontRef idx="minor">
-            <a:schemeClr val="tx1"/>
-          </a:fontRef>
-        </p:style>
-      </p:cxnSp>
-      <p:cxnSp>
-        <p:nvCxnSpPr>
-          <p:cNvPr id="50" name="Elbow Connector 49"/>
-          <p:cNvCxnSpPr>
-            <a:stCxn id="10" idx="3"/>
-            <a:endCxn id="41" idx="2"/>
-          </p:cNvCxnSpPr>
-          <p:nvPr/>
-        </p:nvCxnSpPr>
-        <p:spPr>
-          <a:xfrm flipV="1">
-            <a:off x="2773931" y="3445992"/>
-            <a:ext cx="1125000" cy="877723"/>
-          </a:xfrm>
-          <a:prstGeom prst="bentConnector2">
-            <a:avLst/>
-          </a:prstGeom>
-          <a:ln>
-            <a:tailEnd type="triangle"/>
-          </a:ln>
-        </p:spPr>
-        <p:style>
-          <a:lnRef idx="1">
-            <a:schemeClr val="accent1"/>
-          </a:lnRef>
-          <a:fillRef idx="0">
-            <a:schemeClr val="accent1"/>
-          </a:fillRef>
-          <a:effectRef idx="0">
-            <a:schemeClr val="accent1"/>
-          </a:effectRef>
-          <a:fontRef idx="minor">
-            <a:schemeClr val="tx1"/>
-          </a:fontRef>
-        </p:style>
-      </p:cxnSp>
-      <p:cxnSp>
-        <p:nvCxnSpPr>
-          <p:cNvPr id="52" name="Elbow Connector 51"/>
-          <p:cNvCxnSpPr>
-            <a:stCxn id="39" idx="0"/>
-            <a:endCxn id="42" idx="1"/>
-          </p:cNvCxnSpPr>
-          <p:nvPr/>
-        </p:nvCxnSpPr>
-        <p:spPr>
-          <a:xfrm rot="5400000" flipH="1" flipV="1">
-            <a:off x="4033763" y="4380471"/>
-            <a:ext cx="894256" cy="813814"/>
-          </a:xfrm>
-          <a:prstGeom prst="bentConnector2">
-            <a:avLst/>
-          </a:prstGeom>
-          <a:ln>
-            <a:tailEnd type="triangle"/>
-          </a:ln>
-        </p:spPr>
-        <p:style>
-          <a:lnRef idx="1">
-            <a:schemeClr val="accent1"/>
-          </a:lnRef>
-          <a:fillRef idx="0">
-            <a:schemeClr val="accent1"/>
-          </a:fillRef>
-          <a:effectRef idx="0">
-            <a:schemeClr val="accent1"/>
-          </a:effectRef>
-          <a:fontRef idx="minor">
-            <a:schemeClr val="tx1"/>
-          </a:fontRef>
-        </p:style>
-      </p:cxnSp>
-      <p:cxnSp>
-        <p:nvCxnSpPr>
-          <p:cNvPr id="54" name="Elbow Connector 53"/>
-          <p:cNvCxnSpPr>
-            <a:stCxn id="40" idx="0"/>
-            <a:endCxn id="42" idx="3"/>
-          </p:cNvCxnSpPr>
-          <p:nvPr/>
-        </p:nvCxnSpPr>
-        <p:spPr>
-          <a:xfrm rot="16200000" flipV="1">
-            <a:off x="5650493" y="4351899"/>
-            <a:ext cx="894256" cy="870957"/>
-          </a:xfrm>
-          <a:prstGeom prst="bentConnector2">
-            <a:avLst/>
-          </a:prstGeom>
-          <a:ln>
-            <a:tailEnd type="triangle"/>
-          </a:ln>
-        </p:spPr>
-        <p:style>
-          <a:lnRef idx="1">
-            <a:schemeClr val="accent1"/>
-          </a:lnRef>
-          <a:fillRef idx="0">
-            <a:schemeClr val="accent1"/>
-          </a:fillRef>
-          <a:effectRef idx="0">
-            <a:schemeClr val="accent1"/>
-          </a:effectRef>
-          <a:fontRef idx="minor">
-            <a:schemeClr val="tx1"/>
-          </a:fontRef>
-        </p:style>
-      </p:cxnSp>
-      <p:sp>
-        <p:nvSpPr>
-          <p:cNvPr id="55" name="Cloud 54"/>
-          <p:cNvSpPr/>
-          <p:nvPr/>
-        </p:nvSpPr>
-        <p:spPr>
-          <a:xfrm>
-            <a:off x="4887798" y="2202271"/>
-            <a:ext cx="2004187" cy="1168778"/>
-          </a:xfrm>
-          <a:prstGeom prst="cloud">
-            <a:avLst/>
-          </a:prstGeom>
-        </p:spPr>
-        <p:style>
-          <a:lnRef idx="2">
-            <a:schemeClr val="accent1">
-              <a:shade val="50000"/>
-            </a:schemeClr>
-          </a:lnRef>
-          <a:fillRef idx="1">
-            <a:schemeClr val="accent1"/>
-          </a:fillRef>
-          <a:effectRef idx="0">
-            <a:schemeClr val="accent1"/>
-          </a:effectRef>
-          <a:fontRef idx="minor">
-            <a:schemeClr val="lt1"/>
-          </a:fontRef>
-        </p:style>
-        <p:txBody>
-          <a:bodyPr rtlCol="0" anchor="ctr"/>
-          <a:lstStyle/>
-          <a:p>
-            <a:pPr algn="ctr"/>
-            <a:r>
-              <a:rPr lang="en-US" b="1" dirty="0" smtClean="0"/>
-              <a:t>ES Cluster</a:t>
-            </a:r>
-            <a:endParaRPr lang="en-US" b="1" dirty="0"/>
-          </a:p>
-        </p:txBody>
-      </p:sp>
-      <p:cxnSp>
-        <p:nvCxnSpPr>
-          <p:cNvPr id="57" name="Elbow Connector 56"/>
-          <p:cNvCxnSpPr>
-            <a:stCxn id="43" idx="2"/>
-            <a:endCxn id="55" idx="3"/>
-          </p:cNvCxnSpPr>
-          <p:nvPr/>
-        </p:nvCxnSpPr>
-        <p:spPr>
-          <a:xfrm rot="16200000" flipH="1">
-            <a:off x="5294988" y="1674193"/>
-            <a:ext cx="574886" cy="614922"/>
-          </a:xfrm>
-          <a:prstGeom prst="bentConnector3">
-            <a:avLst/>
-          </a:prstGeom>
-          <a:ln>
-            <a:tailEnd type="triangle"/>
-          </a:ln>
-        </p:spPr>
-        <p:style>
-          <a:lnRef idx="1">
-            <a:schemeClr val="accent1"/>
-          </a:lnRef>
-          <a:fillRef idx="0">
-            <a:schemeClr val="accent1"/>
-          </a:fillRef>
-          <a:effectRef idx="0">
-            <a:schemeClr val="accent1"/>
-          </a:effectRef>
-          <a:fontRef idx="minor">
-            <a:schemeClr val="tx1"/>
-          </a:fontRef>
-        </p:style>
-      </p:cxnSp>
-      <p:cxnSp>
-        <p:nvCxnSpPr>
-          <p:cNvPr id="59" name="Elbow Connector 58"/>
-          <p:cNvCxnSpPr>
-            <a:stCxn id="44" idx="2"/>
-            <a:endCxn id="55" idx="3"/>
-          </p:cNvCxnSpPr>
-          <p:nvPr/>
-        </p:nvCxnSpPr>
-        <p:spPr>
-          <a:xfrm rot="5400000">
-            <a:off x="5965252" y="1618851"/>
-            <a:ext cx="574886" cy="725606"/>
-          </a:xfrm>
-          <a:prstGeom prst="bentConnector3">
-            <a:avLst/>
-          </a:prstGeom>
-          <a:ln>
-            <a:tailEnd type="triangle"/>
-          </a:ln>
-        </p:spPr>
-        <p:style>
-          <a:lnRef idx="1">
-            <a:schemeClr val="accent1"/>
-          </a:lnRef>
-          <a:fillRef idx="0">
-            <a:schemeClr val="accent1"/>
-          </a:fillRef>
-          <a:effectRef idx="0">
-            <a:schemeClr val="accent1"/>
-          </a:effectRef>
-          <a:fontRef idx="minor">
-            <a:schemeClr val="tx1"/>
-          </a:fontRef>
-        </p:style>
-      </p:cxnSp>
-      <p:cxnSp>
-        <p:nvCxnSpPr>
-          <p:cNvPr id="61" name="Elbow Connector 60"/>
-          <p:cNvCxnSpPr>
-            <a:stCxn id="41" idx="3"/>
-            <a:endCxn id="55" idx="2"/>
-          </p:cNvCxnSpPr>
-          <p:nvPr/>
-        </p:nvCxnSpPr>
-        <p:spPr>
-          <a:xfrm flipV="1">
-            <a:off x="4286103" y="2786660"/>
-            <a:ext cx="607912" cy="2877"/>
-          </a:xfrm>
-          <a:prstGeom prst="bentConnector3">
-            <a:avLst/>
-          </a:prstGeom>
-          <a:ln>
-            <a:tailEnd type="triangle"/>
-          </a:ln>
-        </p:spPr>
-        <p:style>
-          <a:lnRef idx="1">
-            <a:schemeClr val="accent1"/>
-          </a:lnRef>
-          <a:fillRef idx="0">
-            <a:schemeClr val="accent1"/>
-          </a:fillRef>
-          <a:effectRef idx="0">
-            <a:schemeClr val="accent1"/>
-          </a:effectRef>
-          <a:fontRef idx="minor">
-            <a:schemeClr val="tx1"/>
-          </a:fontRef>
-        </p:style>
-      </p:cxnSp>
-      <p:cxnSp>
-        <p:nvCxnSpPr>
-          <p:cNvPr id="63" name="Elbow Connector 62"/>
-          <p:cNvCxnSpPr>
-            <a:stCxn id="42" idx="0"/>
-            <a:endCxn id="55" idx="1"/>
-          </p:cNvCxnSpPr>
-          <p:nvPr/>
-        </p:nvCxnSpPr>
-        <p:spPr>
-          <a:xfrm rot="5400000" flipH="1" flipV="1">
-            <a:off x="5425436" y="3219338"/>
-            <a:ext cx="313990" cy="614922"/>
-          </a:xfrm>
-          <a:prstGeom prst="bentConnector3">
-            <a:avLst/>
-          </a:prstGeom>
-          <a:ln>
-            <a:tailEnd type="triangle"/>
-          </a:ln>
-        </p:spPr>
-        <p:style>
-          <a:lnRef idx="1">
-            <a:schemeClr val="accent1"/>
-          </a:lnRef>
-          <a:fillRef idx="0">
-            <a:schemeClr val="accent1"/>
-          </a:fillRef>
-          <a:effectRef idx="0">
-            <a:schemeClr val="accent1"/>
-          </a:effectRef>
-          <a:fontRef idx="minor">
-            <a:schemeClr val="tx1"/>
-          </a:fontRef>
-        </p:style>
-      </p:cxnSp>
-      <p:sp>
-        <p:nvSpPr>
-          <p:cNvPr id="64" name="Rectangle 63"/>
-          <p:cNvSpPr/>
-          <p:nvPr/>
-        </p:nvSpPr>
-        <p:spPr>
-          <a:xfrm rot="5400000">
-            <a:off x="7161380" y="2543860"/>
-            <a:ext cx="1821662" cy="551348"/>
-          </a:xfrm>
-          <a:prstGeom prst="rect">
-            <a:avLst/>
-          </a:prstGeom>
-        </p:spPr>
-        <p:style>
-          <a:lnRef idx="2">
-            <a:schemeClr val="accent1">
-              <a:shade val="50000"/>
-            </a:schemeClr>
-          </a:lnRef>
-          <a:fillRef idx="1">
-            <a:schemeClr val="accent1"/>
-          </a:fillRef>
-          <a:effectRef idx="0">
-            <a:schemeClr val="accent1"/>
-          </a:effectRef>
-          <a:fontRef idx="minor">
-            <a:schemeClr val="lt1"/>
-          </a:fontRef>
-        </p:style>
-        <p:txBody>
-          <a:bodyPr rtlCol="0" anchor="ctr"/>
-          <a:lstStyle/>
-          <a:p>
-            <a:pPr algn="ctr"/>
-            <a:r>
-              <a:rPr lang="en-US" dirty="0" smtClean="0"/>
-              <a:t>Sensor Data API</a:t>
-            </a:r>
-            <a:endParaRPr lang="en-US" dirty="0"/>
-          </a:p>
-        </p:txBody>
-      </p:sp>
-      <p:sp>
-        <p:nvSpPr>
-          <p:cNvPr id="65" name="Left-Right Arrow 64"/>
-          <p:cNvSpPr/>
-          <p:nvPr/>
-        </p:nvSpPr>
-        <p:spPr>
-          <a:xfrm>
-            <a:off x="8347885" y="2622887"/>
-            <a:ext cx="893768" cy="327545"/>
-          </a:xfrm>
-          <a:prstGeom prst="leftRightArrow">
-            <a:avLst/>
-          </a:prstGeom>
-        </p:spPr>
-        <p:style>
-          <a:lnRef idx="1">
-            <a:schemeClr val="dk1"/>
-          </a:lnRef>
-          <a:fillRef idx="3">
-            <a:schemeClr val="dk1"/>
-          </a:fillRef>
-          <a:effectRef idx="2">
-            <a:schemeClr val="dk1"/>
-          </a:effectRef>
-          <a:fontRef idx="minor">
-            <a:schemeClr val="lt1"/>
-          </a:fontRef>
-        </p:style>
-        <p:txBody>
-          <a:bodyPr rtlCol="0" anchor="ctr"/>
-          <a:lstStyle/>
-          <a:p>
-            <a:pPr algn="ctr"/>
-            <a:endParaRPr lang="en-US"/>
-          </a:p>
-        </p:txBody>
-      </p:sp>
-      <p:sp>
-        <p:nvSpPr>
-          <p:cNvPr id="66" name="Left-Right Arrow 65"/>
-          <p:cNvSpPr/>
-          <p:nvPr/>
-        </p:nvSpPr>
-        <p:spPr>
-          <a:xfrm>
-            <a:off x="6891985" y="2622886"/>
-            <a:ext cx="893768" cy="327545"/>
-          </a:xfrm>
-          <a:prstGeom prst="leftRightArrow">
-            <a:avLst/>
-          </a:prstGeom>
-        </p:spPr>
-        <p:style>
-          <a:lnRef idx="1">
-            <a:schemeClr val="dk1"/>
-          </a:lnRef>
-          <a:fillRef idx="3">
-            <a:schemeClr val="dk1"/>
-          </a:fillRef>
-          <a:effectRef idx="2">
-            <a:schemeClr val="dk1"/>
-          </a:effectRef>
-          <a:fontRef idx="minor">
-            <a:schemeClr val="lt1"/>
-          </a:fontRef>
-        </p:style>
-        <p:txBody>
-          <a:bodyPr rtlCol="0" anchor="ctr"/>
-          <a:lstStyle/>
-          <a:p>
-            <a:pPr algn="ctr"/>
-            <a:endParaRPr lang="en-US"/>
-          </a:p>
-        </p:txBody>
-      </p:sp>
-      <p:sp>
-        <p:nvSpPr>
-          <p:cNvPr id="4" name="Title 3"/>
-          <p:cNvSpPr>
-            <a:spLocks noGrp="1"/>
-          </p:cNvSpPr>
-          <p:nvPr>
-            <p:ph type="title"/>
-          </p:nvPr>
-        </p:nvSpPr>
-        <p:spPr>
-          <a:xfrm>
-            <a:off x="839821" y="294283"/>
-            <a:ext cx="10515600" cy="707048"/>
-          </a:xfrm>
-        </p:spPr>
-        <p:txBody>
-          <a:bodyPr>
-            <a:normAutofit/>
-          </a:bodyPr>
-          <a:lstStyle/>
-          <a:p>
-            <a:r>
-              <a:rPr lang="en-US" sz="3600" dirty="0" smtClean="0"/>
-              <a:t>Log Aggregation</a:t>
-            </a:r>
-            <a:endParaRPr lang="en-US" sz="3600" dirty="0"/>
-          </a:p>
-        </p:txBody>
-      </p:sp>
-      <p:sp>
-        <p:nvSpPr>
-          <p:cNvPr id="29" name="Action Button: Home 28">
-            <a:hlinkClick r:id="rId4" action="ppaction://hlinksldjump" highlightClick="1"/>
-          </p:cNvPr>
-          <p:cNvSpPr/>
-          <p:nvPr/>
-        </p:nvSpPr>
-        <p:spPr>
-          <a:xfrm>
-            <a:off x="11660863" y="188793"/>
-            <a:ext cx="352663" cy="352663"/>
-          </a:xfrm>
-          <a:prstGeom prst="actionButtonHome">
-            <a:avLst/>
-          </a:prstGeom>
-        </p:spPr>
-        <p:style>
-          <a:lnRef idx="2">
-            <a:schemeClr val="dk1"/>
-          </a:lnRef>
-          <a:fillRef idx="1">
-            <a:schemeClr val="lt1"/>
-          </a:fillRef>
-          <a:effectRef idx="0">
-            <a:schemeClr val="dk1"/>
-          </a:effectRef>
-          <a:fontRef idx="minor">
-            <a:schemeClr val="dk1"/>
-          </a:fontRef>
-        </p:style>
-        <p:txBody>
-          <a:bodyPr rtlCol="0" anchor="ctr"/>
-          <a:lstStyle/>
-          <a:p>
-            <a:pPr algn="ctr"/>
-            <a:endParaRPr lang="en-US"/>
-          </a:p>
-        </p:txBody>
-      </p:sp>
-    </p:spTree>
-    <p:extLst>
-      <p:ext uri="{BB962C8B-B14F-4D97-AF65-F5344CB8AC3E}">
-        <p14:creationId xmlns:p14="http://schemas.microsoft.com/office/powerpoint/2010/main" val="3140183925"/>
-      </p:ext>
-    </p:extLst>
-  </p:cSld>
-  <p:clrMapOvr>
-    <a:masterClrMapping/>
-  </p:clrMapOvr>
-  <p:timing>
-    <p:tnLst>
-      <p:par>
-        <p:cTn id="1" dur="indefinite" restart="never" nodeType="tmRoot"/>
-      </p:par>
-    </p:tnLst>
-  </p:timing>
-</p:sld>
-</file>
-
 <file path=ppt/theme/theme1.xml><?xml version="1.0" encoding="utf-8"?>
 <a:theme xmlns:a="http://schemas.openxmlformats.org/drawingml/2006/main" name="Office Theme">
   <a:themeElements>

</xml_diff>